<commit_message>
Update: presentation draft for pitch
</commit_message>
<xml_diff>
--- a/Week1_Trapped_Ions/archive/presentation_for_video.pptx
+++ b/Week1_Trapped_Ions/archive/presentation_for_video.pptx
@@ -510,7 +510,11 @@
           <a:p>
             <a:r>
               <a:rPr lang="en-US" baseline="0" dirty="0" smtClean="0"/>
-              <a:t>Hi, we will show you how to use quantum random circuit sampling for …</a:t>
+              <a:t>Hi, we will show you how to use quantum random circuit sampling for </a:t>
+            </a:r>
+            <a:r>
+              <a:rPr lang="en-US" baseline="0" dirty="0" smtClean="0"/>
+              <a:t>a real business application</a:t>
             </a:r>
             <a:endParaRPr lang="nl-NL" dirty="0"/>
           </a:p>
@@ -846,8 +850,19 @@
           <a:p>
             <a:r>
               <a:rPr lang="en-US" baseline="0" dirty="0" smtClean="0"/>
-              <a:t>Similarly this approach can be extended to sample and test power grid topologies, prototype processor architecture or even simulate financial market drivers and atmospheric conditions for aircraft modelling.</a:t>
-            </a:r>
+              <a:t>Similarly this approach can be extended to sample and test power grid topologies, prototype processor architecture or even simulate financial market drivers and atmospheric conditions for aircraft modelling</a:t>
+            </a:r>
+            <a:r>
+              <a:rPr lang="en-US" baseline="0" dirty="0" smtClean="0"/>
+              <a:t>.</a:t>
+            </a:r>
+          </a:p>
+          <a:p>
+            <a:r>
+              <a:rPr lang="en-US" baseline="0" dirty="0" smtClean="0"/>
+              <a:t>The certification </a:t>
+            </a:r>
+            <a:endParaRPr lang="en-US" baseline="0" dirty="0" smtClean="0"/>
           </a:p>
         </p:txBody>
       </p:sp>
@@ -933,11 +948,41 @@
           <a:p>
             <a:r>
               <a:rPr lang="en-US" dirty="0" smtClean="0"/>
-              <a:t>We have to choose what to focus on and give </a:t>
-            </a:r>
-            <a:r>
-              <a:rPr lang="en-US" smtClean="0"/>
-              <a:t>a reason why.</a:t>
+              <a:t>We have to choose what to focus </a:t>
+            </a:r>
+            <a:r>
+              <a:rPr lang="en-US" dirty="0" smtClean="0"/>
+              <a:t>on </a:t>
+            </a:r>
+            <a:r>
+              <a:rPr lang="en-US" dirty="0" smtClean="0"/>
+              <a:t>and give a reason why</a:t>
+            </a:r>
+            <a:r>
+              <a:rPr lang="en-US" dirty="0" smtClean="0"/>
+              <a:t>.</a:t>
+            </a:r>
+          </a:p>
+          <a:p>
+            <a:endParaRPr lang="en-US" dirty="0" smtClean="0"/>
+          </a:p>
+          <a:p>
+            <a:r>
+              <a:rPr lang="en-US" dirty="0" smtClean="0"/>
+              <a:t>Generative models are a popular approach to unsupervised machine learning. Generative neural network models are trained to produce data samples that resemble the training set. </a:t>
+            </a:r>
+          </a:p>
+          <a:p>
+            <a:endParaRPr lang="en-US" dirty="0" smtClean="0"/>
+          </a:p>
+          <a:p>
+            <a:r>
+              <a:rPr lang="en-US" dirty="0" smtClean="0"/>
+              <a:t>We propose for Google a new quantum based method to determine the distribution to</a:t>
+            </a:r>
+            <a:r>
+              <a:rPr lang="en-US" baseline="0" dirty="0" smtClean="0"/>
+              <a:t> be used in the generator of a Generative-Adversarial network. Such distribution can in fact be obtained by efficiently sampling distributions from different quantum random circuits and selecting the best distribution based on the KL distance.</a:t>
             </a:r>
             <a:endParaRPr lang="nl-NL" dirty="0"/>
           </a:p>
@@ -4062,8 +4107,8 @@
         </p:nvSpPr>
         <p:spPr>
           <a:xfrm>
-            <a:off x="2084080" y="1997839"/>
-            <a:ext cx="4968552" cy="2862322"/>
+            <a:off x="1403648" y="1997839"/>
+            <a:ext cx="6264696" cy="1754326"/>
           </a:xfrm>
           <a:prstGeom prst="rect">
             <a:avLst/>
@@ -4084,11 +4129,8 @@
                 </a:solidFill>
                 <a:latin typeface="Century Gothic" panose="020B0502020202020204" pitchFamily="34" charset="0"/>
               </a:rPr>
-              <a:t>Sampling from </a:t>
-            </a:r>
-          </a:p>
-          <a:p>
-            <a:pPr algn="ctr"/>
+              <a:t>Quantum </a:t>
+            </a:r>
             <a:r>
               <a:rPr lang="en-US" sz="3600" dirty="0" smtClean="0">
                 <a:solidFill>
@@ -4096,11 +4138,17 @@
                 </a:solidFill>
                 <a:latin typeface="Century Gothic" panose="020B0502020202020204" pitchFamily="34" charset="0"/>
               </a:rPr>
-              <a:t>Quantum Random Circuits</a:t>
-            </a:r>
-          </a:p>
-          <a:p>
-            <a:pPr algn="ctr"/>
+              <a:t>Random </a:t>
+            </a:r>
+            <a:r>
+              <a:rPr lang="en-US" sz="3600" dirty="0" smtClean="0">
+                <a:solidFill>
+                  <a:schemeClr val="bg1"/>
+                </a:solidFill>
+                <a:latin typeface="Century Gothic" panose="020B0502020202020204" pitchFamily="34" charset="0"/>
+              </a:rPr>
+              <a:t>Circuits, certification and sampling</a:t>
+            </a:r>
             <a:endParaRPr lang="en-US" sz="3600" dirty="0" smtClean="0">
               <a:solidFill>
                 <a:schemeClr val="bg1"/>
@@ -4110,16 +4158,7 @@
           </a:p>
           <a:p>
             <a:pPr algn="ctr"/>
-            <a:r>
-              <a:rPr lang="en-US" sz="3600" dirty="0" smtClean="0">
-                <a:solidFill>
-                  <a:schemeClr val="bg1"/>
-                </a:solidFill>
-                <a:latin typeface="Century Gothic" panose="020B0502020202020204" pitchFamily="34" charset="0"/>
-              </a:rPr>
-              <a:t>The way to …</a:t>
-            </a:r>
-            <a:endParaRPr lang="nl-NL" sz="3600" dirty="0">
+            <a:endParaRPr lang="en-US" sz="3600" dirty="0" smtClean="0">
               <a:solidFill>
                 <a:schemeClr val="bg1"/>
               </a:solidFill>
@@ -4152,7 +4191,7 @@
           <a:p>
             <a:pPr algn="ctr"/>
             <a:r>
-              <a:rPr lang="en-US" sz="2400" dirty="0" smtClean="0">
+              <a:rPr lang="en-US" sz="2400" b="1" dirty="0" smtClean="0">
                 <a:solidFill>
                   <a:schemeClr val="bg1"/>
                 </a:solidFill>
@@ -4160,18 +4199,57 @@
               </a:rPr>
               <a:t>Cohort project </a:t>
             </a:r>
-          </a:p>
-          <a:p>
-            <a:pPr algn="ctr"/>
-            <a:r>
-              <a:rPr lang="en-US" sz="2400" dirty="0" smtClean="0">
+            <a:r>
+              <a:rPr lang="en-US" sz="2400" b="1" dirty="0" smtClean="0">
                 <a:solidFill>
                   <a:schemeClr val="bg1"/>
                 </a:solidFill>
                 <a:latin typeface="Century Gothic" panose="020B0502020202020204" pitchFamily="34" charset="0"/>
               </a:rPr>
-              <a:t>Team 1 (add a name?)</a:t>
-            </a:r>
+              <a:t>Week 1</a:t>
+            </a:r>
+            <a:endParaRPr lang="en-US" sz="2400" b="1" dirty="0" smtClean="0">
+              <a:solidFill>
+                <a:schemeClr val="bg1"/>
+              </a:solidFill>
+              <a:latin typeface="Century Gothic" panose="020B0502020202020204" pitchFamily="34" charset="0"/>
+            </a:endParaRPr>
+          </a:p>
+          <a:p>
+            <a:pPr algn="ctr"/>
+            <a:r>
+              <a:rPr lang="en-US" sz="2400" b="1" dirty="0" smtClean="0">
+                <a:solidFill>
+                  <a:schemeClr val="bg1"/>
+                </a:solidFill>
+                <a:latin typeface="Century Gothic" panose="020B0502020202020204" pitchFamily="34" charset="0"/>
+              </a:rPr>
+              <a:t>Team 1 </a:t>
+            </a:r>
+            <a:r>
+              <a:rPr lang="en-US" sz="2400" b="1" dirty="0" err="1" smtClean="0">
+                <a:solidFill>
+                  <a:schemeClr val="bg1"/>
+                </a:solidFill>
+                <a:latin typeface="Century Gothic" panose="020B0502020202020204" pitchFamily="34" charset="0"/>
+              </a:rPr>
+              <a:t>Entro</a:t>
+            </a:r>
+            <a:r>
+              <a:rPr lang="en-US" sz="2400" b="1" dirty="0" err="1" smtClean="0">
+                <a:solidFill>
+                  <a:schemeClr val="bg1"/>
+                </a:solidFill>
+                <a:latin typeface="Symbol" panose="05050102010706020507" pitchFamily="18" charset="2"/>
+              </a:rPr>
+              <a:t>P</a:t>
+            </a:r>
+            <a:endParaRPr lang="en-US" sz="2400" b="1" dirty="0" smtClean="0">
+              <a:solidFill>
+                <a:schemeClr val="bg1"/>
+              </a:solidFill>
+              <a:latin typeface="Century Gothic" panose="020B0502020202020204" pitchFamily="34" charset="0"/>
+            </a:endParaRPr>
           </a:p>
         </p:txBody>
       </p:sp>
@@ -4329,16 +4407,7 @@
                 </a:solidFill>
                 <a:latin typeface="Century Gothic" panose="020B0502020202020204" pitchFamily="34" charset="0"/>
               </a:rPr>
-              <a:t>Quantum random </a:t>
-            </a:r>
-            <a:r>
-              <a:rPr lang="en-US" sz="3600" dirty="0" smtClean="0">
-                <a:solidFill>
-                  <a:schemeClr val="bg1"/>
-                </a:solidFill>
-                <a:latin typeface="Century Gothic" panose="020B0502020202020204" pitchFamily="34" charset="0"/>
-              </a:rPr>
-              <a:t>circuits: sampling</a:t>
+              <a:t>Quantum random circuits: sampling</a:t>
             </a:r>
             <a:endParaRPr lang="nl-NL" sz="3600" dirty="0">
               <a:solidFill>
@@ -4346,50 +4415,6 @@
               </a:solidFill>
               <a:latin typeface="Century Gothic" panose="020B0502020202020204" pitchFamily="34" charset="0"/>
             </a:endParaRPr>
-          </a:p>
-        </p:txBody>
-      </p:sp>
-      <p:sp>
-        <p:nvSpPr>
-          <p:cNvPr id="2" name="Rectangle 1"/>
-          <p:cNvSpPr/>
-          <p:nvPr/>
-        </p:nvSpPr>
-        <p:spPr>
-          <a:xfrm>
-            <a:off x="755576" y="2708920"/>
-            <a:ext cx="3096344" cy="1800200"/>
-          </a:xfrm>
-          <a:prstGeom prst="rect">
-            <a:avLst/>
-          </a:prstGeom>
-        </p:spPr>
-        <p:style>
-          <a:lnRef idx="2">
-            <a:schemeClr val="accent1">
-              <a:shade val="50000"/>
-            </a:schemeClr>
-          </a:lnRef>
-          <a:fillRef idx="1">
-            <a:schemeClr val="accent1"/>
-          </a:fillRef>
-          <a:effectRef idx="0">
-            <a:schemeClr val="accent1"/>
-          </a:effectRef>
-          <a:fontRef idx="minor">
-            <a:schemeClr val="lt1"/>
-          </a:fontRef>
-        </p:style>
-        <p:txBody>
-          <a:bodyPr rtlCol="0" anchor="ctr"/>
-          <a:lstStyle/>
-          <a:p>
-            <a:pPr algn="ctr"/>
-            <a:r>
-              <a:rPr lang="en-US" dirty="0" smtClean="0"/>
-              <a:t>Picture of (quantum) random circuit</a:t>
-            </a:r>
-            <a:endParaRPr lang="nl-NL" dirty="0"/>
           </a:p>
         </p:txBody>
       </p:sp>
@@ -4663,6 +4688,77 @@
           </a:extLst>
         </p:spPr>
       </p:pic>
+      <p:pic>
+        <p:nvPicPr>
+          <p:cNvPr id="3" name="Picture 2"/>
+          <p:cNvPicPr>
+            <a:picLocks noChangeAspect="1"/>
+          </p:cNvPicPr>
+          <p:nvPr/>
+        </p:nvPicPr>
+        <p:blipFill>
+          <a:blip r:embed="rId7" cstate="print">
+            <a:extLst>
+              <a:ext uri="{28A0092B-C50C-407E-A947-70E740481C1C}">
+                <a14:useLocalDpi xmlns:a14="http://schemas.microsoft.com/office/drawing/2010/main" val="0"/>
+              </a:ext>
+            </a:extLst>
+          </a:blip>
+          <a:stretch>
+            <a:fillRect/>
+          </a:stretch>
+        </p:blipFill>
+        <p:spPr>
+          <a:xfrm>
+            <a:off x="2168311" y="4941168"/>
+            <a:ext cx="2403688" cy="1602459"/>
+          </a:xfrm>
+          <a:prstGeom prst="rect">
+            <a:avLst/>
+          </a:prstGeom>
+        </p:spPr>
+      </p:pic>
+      <p:pic>
+        <p:nvPicPr>
+          <p:cNvPr id="5" name="Picture 2" descr="Google verricht quantumberekening waar klassieke computer 10.000 jaar over  doet - IT Pro - Nieuws - Tweakers"/>
+          <p:cNvPicPr>
+            <a:picLocks noChangeAspect="1" noChangeArrowheads="1"/>
+          </p:cNvPicPr>
+          <p:nvPr/>
+        </p:nvPicPr>
+        <p:blipFill>
+          <a:blip r:embed="rId8">
+            <a:extLst>
+              <a:ext uri="{28A0092B-C50C-407E-A947-70E740481C1C}">
+                <a14:useLocalDpi xmlns:a14="http://schemas.microsoft.com/office/drawing/2010/main" val="0"/>
+              </a:ext>
+            </a:extLst>
+          </a:blip>
+          <a:srcRect/>
+          <a:stretch>
+            <a:fillRect/>
+          </a:stretch>
+        </p:blipFill>
+        <p:spPr bwMode="auto">
+          <a:xfrm>
+            <a:off x="327907" y="2250692"/>
+            <a:ext cx="3680808" cy="2356615"/>
+          </a:xfrm>
+          <a:prstGeom prst="rect">
+            <a:avLst/>
+          </a:prstGeom>
+          <a:noFill/>
+          <a:extLst>
+            <a:ext uri="{909E8E84-426E-40DD-AFC4-6F175D3DCCD1}">
+              <a14:hiddenFill xmlns:a14="http://schemas.microsoft.com/office/drawing/2010/main">
+                <a:solidFill>
+                  <a:srgbClr val="FFFFFF"/>
+                </a:solidFill>
+              </a14:hiddenFill>
+            </a:ext>
+          </a:extLst>
+        </p:spPr>
+      </p:pic>
     </p:spTree>
     <p:extLst>
       <p:ext uri="{BB962C8B-B14F-4D97-AF65-F5344CB8AC3E}">
@@ -4676,7 +4772,336 @@
   <p:timing>
     <p:tnLst>
       <p:par>
-        <p:cTn id="1" dur="indefinite" restart="never" nodeType="tmRoot"/>
+        <p:cTn id="1" dur="indefinite" restart="never" nodeType="tmRoot">
+          <p:childTnLst>
+            <p:seq concurrent="1" nextAc="seek">
+              <p:cTn id="2" dur="indefinite" nodeType="mainSeq">
+                <p:childTnLst>
+                  <p:par>
+                    <p:cTn id="3" fill="hold">
+                      <p:stCondLst>
+                        <p:cond delay="indefinite"/>
+                      </p:stCondLst>
+                      <p:childTnLst>
+                        <p:par>
+                          <p:cTn id="4" fill="hold">
+                            <p:stCondLst>
+                              <p:cond delay="0"/>
+                            </p:stCondLst>
+                            <p:childTnLst>
+                              <p:par>
+                                <p:cTn id="5" presetID="1" presetClass="entr" presetSubtype="0" fill="hold" nodeType="clickEffect">
+                                  <p:stCondLst>
+                                    <p:cond delay="0"/>
+                                  </p:stCondLst>
+                                  <p:childTnLst>
+                                    <p:set>
+                                      <p:cBhvr>
+                                        <p:cTn id="6" dur="1" fill="hold">
+                                          <p:stCondLst>
+                                            <p:cond delay="0"/>
+                                          </p:stCondLst>
+                                        </p:cTn>
+                                        <p:tgtEl>
+                                          <p:spTgt spid="5"/>
+                                        </p:tgtEl>
+                                        <p:attrNameLst>
+                                          <p:attrName>style.visibility</p:attrName>
+                                        </p:attrNameLst>
+                                      </p:cBhvr>
+                                      <p:to>
+                                        <p:strVal val="visible"/>
+                                      </p:to>
+                                    </p:set>
+                                  </p:childTnLst>
+                                </p:cTn>
+                              </p:par>
+                            </p:childTnLst>
+                          </p:cTn>
+                        </p:par>
+                      </p:childTnLst>
+                    </p:cTn>
+                  </p:par>
+                  <p:par>
+                    <p:cTn id="7" fill="hold">
+                      <p:stCondLst>
+                        <p:cond delay="indefinite"/>
+                      </p:stCondLst>
+                      <p:childTnLst>
+                        <p:par>
+                          <p:cTn id="8" fill="hold">
+                            <p:stCondLst>
+                              <p:cond delay="0"/>
+                            </p:stCondLst>
+                            <p:childTnLst>
+                              <p:par>
+                                <p:cTn id="9" presetID="1" presetClass="entr" presetSubtype="0" fill="hold" nodeType="clickEffect">
+                                  <p:stCondLst>
+                                    <p:cond delay="0"/>
+                                  </p:stCondLst>
+                                  <p:childTnLst>
+                                    <p:set>
+                                      <p:cBhvr>
+                                        <p:cTn id="10" dur="1" fill="hold">
+                                          <p:stCondLst>
+                                            <p:cond delay="0"/>
+                                          </p:stCondLst>
+                                        </p:cTn>
+                                        <p:tgtEl>
+                                          <p:spTgt spid="7"/>
+                                        </p:tgtEl>
+                                        <p:attrNameLst>
+                                          <p:attrName>style.visibility</p:attrName>
+                                        </p:attrNameLst>
+                                      </p:cBhvr>
+                                      <p:to>
+                                        <p:strVal val="visible"/>
+                                      </p:to>
+                                    </p:set>
+                                  </p:childTnLst>
+                                </p:cTn>
+                              </p:par>
+                              <p:par>
+                                <p:cTn id="11" presetID="1" presetClass="entr" presetSubtype="0" fill="hold" nodeType="withEffect">
+                                  <p:stCondLst>
+                                    <p:cond delay="0"/>
+                                  </p:stCondLst>
+                                  <p:childTnLst>
+                                    <p:set>
+                                      <p:cBhvr>
+                                        <p:cTn id="12" dur="1" fill="hold">
+                                          <p:stCondLst>
+                                            <p:cond delay="0"/>
+                                          </p:stCondLst>
+                                        </p:cTn>
+                                        <p:tgtEl>
+                                          <p:spTgt spid="2050"/>
+                                        </p:tgtEl>
+                                        <p:attrNameLst>
+                                          <p:attrName>style.visibility</p:attrName>
+                                        </p:attrNameLst>
+                                      </p:cBhvr>
+                                      <p:to>
+                                        <p:strVal val="visible"/>
+                                      </p:to>
+                                    </p:set>
+                                  </p:childTnLst>
+                                </p:cTn>
+                              </p:par>
+                            </p:childTnLst>
+                          </p:cTn>
+                        </p:par>
+                      </p:childTnLst>
+                    </p:cTn>
+                  </p:par>
+                  <p:par>
+                    <p:cTn id="13" fill="hold">
+                      <p:stCondLst>
+                        <p:cond delay="indefinite"/>
+                      </p:stCondLst>
+                      <p:childTnLst>
+                        <p:par>
+                          <p:cTn id="14" fill="hold">
+                            <p:stCondLst>
+                              <p:cond delay="0"/>
+                            </p:stCondLst>
+                            <p:childTnLst>
+                              <p:par>
+                                <p:cTn id="15" presetID="1" presetClass="entr" presetSubtype="0" fill="hold" nodeType="clickEffect">
+                                  <p:stCondLst>
+                                    <p:cond delay="0"/>
+                                  </p:stCondLst>
+                                  <p:childTnLst>
+                                    <p:set>
+                                      <p:cBhvr>
+                                        <p:cTn id="16" dur="1" fill="hold">
+                                          <p:stCondLst>
+                                            <p:cond delay="0"/>
+                                          </p:stCondLst>
+                                        </p:cTn>
+                                        <p:tgtEl>
+                                          <p:spTgt spid="9"/>
+                                        </p:tgtEl>
+                                        <p:attrNameLst>
+                                          <p:attrName>style.visibility</p:attrName>
+                                        </p:attrNameLst>
+                                      </p:cBhvr>
+                                      <p:to>
+                                        <p:strVal val="visible"/>
+                                      </p:to>
+                                    </p:set>
+                                  </p:childTnLst>
+                                </p:cTn>
+                              </p:par>
+                              <p:par>
+                                <p:cTn id="17" presetID="1" presetClass="entr" presetSubtype="0" fill="hold" nodeType="withEffect">
+                                  <p:stCondLst>
+                                    <p:cond delay="0"/>
+                                  </p:stCondLst>
+                                  <p:childTnLst>
+                                    <p:set>
+                                      <p:cBhvr>
+                                        <p:cTn id="18" dur="1" fill="hold">
+                                          <p:stCondLst>
+                                            <p:cond delay="0"/>
+                                          </p:stCondLst>
+                                        </p:cTn>
+                                        <p:tgtEl>
+                                          <p:spTgt spid="2051"/>
+                                        </p:tgtEl>
+                                        <p:attrNameLst>
+                                          <p:attrName>style.visibility</p:attrName>
+                                        </p:attrNameLst>
+                                      </p:cBhvr>
+                                      <p:to>
+                                        <p:strVal val="visible"/>
+                                      </p:to>
+                                    </p:set>
+                                  </p:childTnLst>
+                                </p:cTn>
+                              </p:par>
+                            </p:childTnLst>
+                          </p:cTn>
+                        </p:par>
+                      </p:childTnLst>
+                    </p:cTn>
+                  </p:par>
+                  <p:par>
+                    <p:cTn id="19" fill="hold">
+                      <p:stCondLst>
+                        <p:cond delay="indefinite"/>
+                      </p:stCondLst>
+                      <p:childTnLst>
+                        <p:par>
+                          <p:cTn id="20" fill="hold">
+                            <p:stCondLst>
+                              <p:cond delay="0"/>
+                            </p:stCondLst>
+                            <p:childTnLst>
+                              <p:par>
+                                <p:cTn id="21" presetID="1" presetClass="entr" presetSubtype="0" fill="hold" nodeType="clickEffect">
+                                  <p:stCondLst>
+                                    <p:cond delay="0"/>
+                                  </p:stCondLst>
+                                  <p:childTnLst>
+                                    <p:set>
+                                      <p:cBhvr>
+                                        <p:cTn id="22" dur="1" fill="hold">
+                                          <p:stCondLst>
+                                            <p:cond delay="0"/>
+                                          </p:stCondLst>
+                                        </p:cTn>
+                                        <p:tgtEl>
+                                          <p:spTgt spid="10"/>
+                                        </p:tgtEl>
+                                        <p:attrNameLst>
+                                          <p:attrName>style.visibility</p:attrName>
+                                        </p:attrNameLst>
+                                      </p:cBhvr>
+                                      <p:to>
+                                        <p:strVal val="visible"/>
+                                      </p:to>
+                                    </p:set>
+                                  </p:childTnLst>
+                                </p:cTn>
+                              </p:par>
+                              <p:par>
+                                <p:cTn id="23" presetID="1" presetClass="entr" presetSubtype="0" fill="hold" nodeType="withEffect">
+                                  <p:stCondLst>
+                                    <p:cond delay="0"/>
+                                  </p:stCondLst>
+                                  <p:childTnLst>
+                                    <p:set>
+                                      <p:cBhvr>
+                                        <p:cTn id="24" dur="1" fill="hold">
+                                          <p:stCondLst>
+                                            <p:cond delay="0"/>
+                                          </p:stCondLst>
+                                        </p:cTn>
+                                        <p:tgtEl>
+                                          <p:spTgt spid="2052"/>
+                                        </p:tgtEl>
+                                        <p:attrNameLst>
+                                          <p:attrName>style.visibility</p:attrName>
+                                        </p:attrNameLst>
+                                      </p:cBhvr>
+                                      <p:to>
+                                        <p:strVal val="visible"/>
+                                      </p:to>
+                                    </p:set>
+                                  </p:childTnLst>
+                                </p:cTn>
+                              </p:par>
+                            </p:childTnLst>
+                          </p:cTn>
+                        </p:par>
+                      </p:childTnLst>
+                    </p:cTn>
+                  </p:par>
+                  <p:par>
+                    <p:cTn id="25" fill="hold">
+                      <p:stCondLst>
+                        <p:cond delay="indefinite"/>
+                      </p:stCondLst>
+                      <p:childTnLst>
+                        <p:par>
+                          <p:cTn id="26" fill="hold">
+                            <p:stCondLst>
+                              <p:cond delay="0"/>
+                            </p:stCondLst>
+                            <p:childTnLst>
+                              <p:par>
+                                <p:cTn id="27" presetID="1" presetClass="entr" presetSubtype="0" fill="hold" nodeType="clickEffect">
+                                  <p:stCondLst>
+                                    <p:cond delay="0"/>
+                                  </p:stCondLst>
+                                  <p:childTnLst>
+                                    <p:set>
+                                      <p:cBhvr>
+                                        <p:cTn id="28" dur="1" fill="hold">
+                                          <p:stCondLst>
+                                            <p:cond delay="0"/>
+                                          </p:stCondLst>
+                                        </p:cTn>
+                                        <p:tgtEl>
+                                          <p:spTgt spid="3"/>
+                                        </p:tgtEl>
+                                        <p:attrNameLst>
+                                          <p:attrName>style.visibility</p:attrName>
+                                        </p:attrNameLst>
+                                      </p:cBhvr>
+                                      <p:to>
+                                        <p:strVal val="visible"/>
+                                      </p:to>
+                                    </p:set>
+                                  </p:childTnLst>
+                                </p:cTn>
+                              </p:par>
+                            </p:childTnLst>
+                          </p:cTn>
+                        </p:par>
+                      </p:childTnLst>
+                    </p:cTn>
+                  </p:par>
+                </p:childTnLst>
+              </p:cTn>
+              <p:prevCondLst>
+                <p:cond evt="onPrev" delay="0">
+                  <p:tgtEl>
+                    <p:sldTgt/>
+                  </p:tgtEl>
+                </p:cond>
+              </p:prevCondLst>
+              <p:nextCondLst>
+                <p:cond evt="onNext" delay="0">
+                  <p:tgtEl>
+                    <p:sldTgt/>
+                  </p:tgtEl>
+                </p:cond>
+              </p:nextCondLst>
+            </p:seq>
+          </p:childTnLst>
+        </p:cTn>
       </p:par>
     </p:tnLst>
   </p:timing>
@@ -4817,16 +5242,7 @@
                 </a:solidFill>
                 <a:latin typeface="Century Gothic" panose="020B0502020202020204" pitchFamily="34" charset="0"/>
               </a:rPr>
-              <a:t>Quantum random </a:t>
-            </a:r>
-            <a:r>
-              <a:rPr lang="en-US" sz="3600" dirty="0" smtClean="0">
-                <a:solidFill>
-                  <a:schemeClr val="bg1"/>
-                </a:solidFill>
-                <a:latin typeface="Century Gothic" panose="020B0502020202020204" pitchFamily="34" charset="0"/>
-              </a:rPr>
-              <a:t>circuits</a:t>
+              <a:t>Quantum random circuits</a:t>
             </a:r>
             <a:r>
               <a:rPr lang="en-US" sz="3600" smtClean="0">
@@ -4846,168 +5262,16 @@
           </a:p>
         </p:txBody>
       </p:sp>
-      <p:sp>
-        <p:nvSpPr>
-          <p:cNvPr id="2" name="Rectangle 1"/>
-          <p:cNvSpPr/>
-          <p:nvPr/>
-        </p:nvSpPr>
-        <p:spPr>
-          <a:xfrm>
-            <a:off x="755576" y="2708920"/>
-            <a:ext cx="3096344" cy="1800200"/>
-          </a:xfrm>
-          <a:prstGeom prst="rect">
-            <a:avLst/>
-          </a:prstGeom>
-        </p:spPr>
-        <p:style>
-          <a:lnRef idx="2">
-            <a:schemeClr val="accent1">
-              <a:shade val="50000"/>
-            </a:schemeClr>
-          </a:lnRef>
-          <a:fillRef idx="1">
-            <a:schemeClr val="accent1"/>
-          </a:fillRef>
-          <a:effectRef idx="0">
-            <a:schemeClr val="accent1"/>
-          </a:effectRef>
-          <a:fontRef idx="minor">
-            <a:schemeClr val="lt1"/>
-          </a:fontRef>
-        </p:style>
-        <p:txBody>
-          <a:bodyPr rtlCol="0" anchor="ctr"/>
-          <a:lstStyle/>
-          <a:p>
-            <a:pPr algn="ctr"/>
-            <a:r>
-              <a:rPr lang="en-US" dirty="0" smtClean="0"/>
-              <a:t>Picture of (quantum) random circuit</a:t>
-            </a:r>
-            <a:endParaRPr lang="nl-NL" dirty="0"/>
-          </a:p>
-        </p:txBody>
-      </p:sp>
-      <p:cxnSp>
-        <p:nvCxnSpPr>
-          <p:cNvPr id="7" name="Straight Arrow Connector 6"/>
-          <p:cNvCxnSpPr/>
-          <p:nvPr/>
-        </p:nvCxnSpPr>
-        <p:spPr>
-          <a:xfrm flipV="1">
-            <a:off x="4067944" y="2687356"/>
-            <a:ext cx="1512168" cy="576064"/>
-          </a:xfrm>
-          <a:prstGeom prst="straightConnector1">
-            <a:avLst/>
-          </a:prstGeom>
-          <a:ln w="57150">
-            <a:solidFill>
-              <a:schemeClr val="bg1"/>
-            </a:solidFill>
-            <a:tailEnd type="arrow"/>
-          </a:ln>
-        </p:spPr>
-        <p:style>
-          <a:lnRef idx="1">
-            <a:schemeClr val="accent1"/>
-          </a:lnRef>
-          <a:fillRef idx="0">
-            <a:schemeClr val="accent1"/>
-          </a:fillRef>
-          <a:effectRef idx="0">
-            <a:schemeClr val="accent1"/>
-          </a:effectRef>
-          <a:fontRef idx="minor">
-            <a:schemeClr val="tx1"/>
-          </a:fontRef>
-        </p:style>
-      </p:cxnSp>
-      <p:cxnSp>
-        <p:nvCxnSpPr>
-          <p:cNvPr id="9" name="Straight Arrow Connector 8"/>
-          <p:cNvCxnSpPr/>
-          <p:nvPr/>
-        </p:nvCxnSpPr>
-        <p:spPr>
-          <a:xfrm>
-            <a:off x="4067944" y="3568220"/>
-            <a:ext cx="2088232" cy="271263"/>
-          </a:xfrm>
-          <a:prstGeom prst="straightConnector1">
-            <a:avLst/>
-          </a:prstGeom>
-          <a:ln w="57150">
-            <a:solidFill>
-              <a:schemeClr val="bg1"/>
-            </a:solidFill>
-            <a:tailEnd type="arrow"/>
-          </a:ln>
-        </p:spPr>
-        <p:style>
-          <a:lnRef idx="1">
-            <a:schemeClr val="accent1"/>
-          </a:lnRef>
-          <a:fillRef idx="0">
-            <a:schemeClr val="accent1"/>
-          </a:fillRef>
-          <a:effectRef idx="0">
-            <a:schemeClr val="accent1"/>
-          </a:effectRef>
-          <a:fontRef idx="minor">
-            <a:schemeClr val="tx1"/>
-          </a:fontRef>
-        </p:style>
-      </p:cxnSp>
-      <p:cxnSp>
-        <p:nvCxnSpPr>
-          <p:cNvPr id="10" name="Straight Arrow Connector 9"/>
-          <p:cNvCxnSpPr/>
-          <p:nvPr/>
-        </p:nvCxnSpPr>
-        <p:spPr>
-          <a:xfrm>
-            <a:off x="4067944" y="3839484"/>
-            <a:ext cx="1703040" cy="1584176"/>
-          </a:xfrm>
-          <a:prstGeom prst="straightConnector1">
-            <a:avLst/>
-          </a:prstGeom>
-          <a:ln w="57150">
-            <a:solidFill>
-              <a:schemeClr val="bg1"/>
-            </a:solidFill>
-            <a:tailEnd type="arrow"/>
-          </a:ln>
-        </p:spPr>
-        <p:style>
-          <a:lnRef idx="1">
-            <a:schemeClr val="accent1"/>
-          </a:lnRef>
-          <a:fillRef idx="0">
-            <a:schemeClr val="accent1"/>
-          </a:fillRef>
-          <a:effectRef idx="0">
-            <a:schemeClr val="accent1"/>
-          </a:effectRef>
-          <a:fontRef idx="minor">
-            <a:schemeClr val="tx1"/>
-          </a:fontRef>
-        </p:style>
-      </p:cxnSp>
       <p:pic>
         <p:nvPicPr>
-          <p:cNvPr id="2050" name="Picture 2"/>
+          <p:cNvPr id="3" name="Picture 2" descr="Hardware Random Number Generators | Blogs"/>
           <p:cNvPicPr>
             <a:picLocks noChangeAspect="1" noChangeArrowheads="1"/>
           </p:cNvPicPr>
           <p:nvPr/>
         </p:nvPicPr>
         <p:blipFill>
-          <a:blip r:embed="rId4">
+          <a:blip r:embed="rId4" cstate="print">
             <a:extLst>
               <a:ext uri="{28A0092B-C50C-407E-A947-70E740481C1C}">
                 <a14:useLocalDpi xmlns:a14="http://schemas.microsoft.com/office/drawing/2010/main" val="0"/>
@@ -5021,40 +5285,27 @@
         </p:blipFill>
         <p:spPr bwMode="auto">
           <a:xfrm>
-            <a:off x="5702426" y="1916832"/>
-            <a:ext cx="1893910" cy="975651"/>
+            <a:off x="5436095" y="2132855"/>
+            <a:ext cx="3240359" cy="2592288"/>
           </a:xfrm>
           <a:prstGeom prst="rect">
             <a:avLst/>
           </a:prstGeom>
           <a:noFill/>
-          <a:ln>
-            <a:noFill/>
-          </a:ln>
           <a:extLst>
             <a:ext uri="{909E8E84-426E-40DD-AFC4-6F175D3DCCD1}">
               <a14:hiddenFill xmlns:a14="http://schemas.microsoft.com/office/drawing/2010/main">
                 <a:solidFill>
-                  <a:schemeClr val="accent1"/>
+                  <a:srgbClr val="FFFFFF"/>
                 </a:solidFill>
               </a14:hiddenFill>
-            </a:ext>
-            <a:ext uri="{91240B29-F687-4F45-9708-019B960494DF}">
-              <a14:hiddenLine xmlns:a14="http://schemas.microsoft.com/office/drawing/2010/main" w="9525">
-                <a:solidFill>
-                  <a:schemeClr val="tx1"/>
-                </a:solidFill>
-                <a:miter lim="800000"/>
-                <a:headEnd/>
-                <a:tailEnd/>
-              </a14:hiddenLine>
             </a:ext>
           </a:extLst>
         </p:spPr>
       </p:pic>
       <p:pic>
         <p:nvPicPr>
-          <p:cNvPr id="2051" name="Picture 3"/>
+          <p:cNvPr id="13" name="Picture 2" descr="Google verricht quantumberekening waar klassieke computer 10.000 jaar over  doet - IT Pro - Nieuws - Tweakers"/>
           <p:cNvPicPr>
             <a:picLocks noChangeAspect="1" noChangeArrowheads="1"/>
           </p:cNvPicPr>
@@ -5075,47 +5326,82 @@
         </p:blipFill>
         <p:spPr bwMode="auto">
           <a:xfrm>
-            <a:off x="6300192" y="3327067"/>
-            <a:ext cx="1995411" cy="1024833"/>
+            <a:off x="327907" y="2250692"/>
+            <a:ext cx="3680808" cy="2356615"/>
           </a:xfrm>
           <a:prstGeom prst="rect">
             <a:avLst/>
           </a:prstGeom>
           <a:noFill/>
-          <a:ln>
-            <a:noFill/>
-          </a:ln>
           <a:extLst>
             <a:ext uri="{909E8E84-426E-40DD-AFC4-6F175D3DCCD1}">
               <a14:hiddenFill xmlns:a14="http://schemas.microsoft.com/office/drawing/2010/main">
                 <a:solidFill>
-                  <a:schemeClr val="accent1"/>
+                  <a:srgbClr val="FFFFFF"/>
                 </a:solidFill>
               </a14:hiddenFill>
-            </a:ext>
-            <a:ext uri="{91240B29-F687-4F45-9708-019B960494DF}">
-              <a14:hiddenLine xmlns:a14="http://schemas.microsoft.com/office/drawing/2010/main" w="9525">
-                <a:solidFill>
-                  <a:schemeClr val="tx1"/>
-                </a:solidFill>
-                <a:miter lim="800000"/>
-                <a:headEnd/>
-                <a:tailEnd/>
-              </a14:hiddenLine>
             </a:ext>
           </a:extLst>
         </p:spPr>
       </p:pic>
+      <p:sp>
+        <p:nvSpPr>
+          <p:cNvPr id="5" name="Right Arrow 4"/>
+          <p:cNvSpPr/>
+          <p:nvPr/>
+        </p:nvSpPr>
+        <p:spPr>
+          <a:xfrm>
+            <a:off x="4211960" y="3140968"/>
+            <a:ext cx="936104" cy="576064"/>
+          </a:xfrm>
+          <a:prstGeom prst="rightArrow">
+            <a:avLst/>
+          </a:prstGeom>
+          <a:solidFill>
+            <a:schemeClr val="bg1"/>
+          </a:solidFill>
+          <a:ln>
+            <a:solidFill>
+              <a:schemeClr val="bg1"/>
+            </a:solidFill>
+          </a:ln>
+        </p:spPr>
+        <p:style>
+          <a:lnRef idx="2">
+            <a:schemeClr val="accent1">
+              <a:shade val="50000"/>
+            </a:schemeClr>
+          </a:lnRef>
+          <a:fillRef idx="1">
+            <a:schemeClr val="accent1"/>
+          </a:fillRef>
+          <a:effectRef idx="0">
+            <a:schemeClr val="accent1"/>
+          </a:effectRef>
+          <a:fontRef idx="minor">
+            <a:schemeClr val="lt1"/>
+          </a:fontRef>
+        </p:style>
+        <p:txBody>
+          <a:bodyPr rtlCol="0" anchor="ctr"/>
+          <a:lstStyle/>
+          <a:p>
+            <a:pPr algn="ctr"/>
+            <a:endParaRPr lang="nl-NL"/>
+          </a:p>
+        </p:txBody>
+      </p:sp>
       <p:pic>
         <p:nvPicPr>
-          <p:cNvPr id="2052" name="Picture 4"/>
+          <p:cNvPr id="8" name="Picture 4" descr="Certificate Certification - Free image on Pixabay"/>
           <p:cNvPicPr>
             <a:picLocks noChangeAspect="1" noChangeArrowheads="1"/>
           </p:cNvPicPr>
           <p:nvPr/>
         </p:nvPicPr>
         <p:blipFill>
-          <a:blip r:embed="rId6">
+          <a:blip r:embed="rId6" cstate="print">
             <a:extLst>
               <a:ext uri="{28A0092B-C50C-407E-A947-70E740481C1C}">
                 <a14:useLocalDpi xmlns:a14="http://schemas.microsoft.com/office/drawing/2010/main" val="0"/>
@@ -5128,34 +5414,21 @@
           </a:stretch>
         </p:blipFill>
         <p:spPr bwMode="auto">
-          <a:xfrm>
-            <a:off x="5868144" y="4868148"/>
-            <a:ext cx="2176027" cy="1111023"/>
+          <a:xfrm rot="20378857">
+            <a:off x="4757905" y="4562725"/>
+            <a:ext cx="5108188" cy="1364844"/>
           </a:xfrm>
           <a:prstGeom prst="rect">
             <a:avLst/>
           </a:prstGeom>
           <a:noFill/>
-          <a:ln>
-            <a:noFill/>
-          </a:ln>
           <a:extLst>
             <a:ext uri="{909E8E84-426E-40DD-AFC4-6F175D3DCCD1}">
               <a14:hiddenFill xmlns:a14="http://schemas.microsoft.com/office/drawing/2010/main">
                 <a:solidFill>
-                  <a:schemeClr val="accent1"/>
+                  <a:srgbClr val="FFFFFF"/>
                 </a:solidFill>
               </a14:hiddenFill>
-            </a:ext>
-            <a:ext uri="{91240B29-F687-4F45-9708-019B960494DF}">
-              <a14:hiddenLine xmlns:a14="http://schemas.microsoft.com/office/drawing/2010/main" w="9525">
-                <a:solidFill>
-                  <a:schemeClr val="tx1"/>
-                </a:solidFill>
-                <a:miter lim="800000"/>
-                <a:headEnd/>
-                <a:tailEnd/>
-              </a14:hiddenLine>
             </a:ext>
           </a:extLst>
         </p:spPr>
@@ -5173,9 +5446,134 @@
   <p:timing>
     <p:tnLst>
       <p:par>
-        <p:cTn id="1" dur="indefinite" restart="never" nodeType="tmRoot"/>
+        <p:cTn id="1" dur="indefinite" restart="never" nodeType="tmRoot">
+          <p:childTnLst>
+            <p:seq concurrent="1" nextAc="seek">
+              <p:cTn id="2" dur="indefinite" nodeType="mainSeq">
+                <p:childTnLst>
+                  <p:par>
+                    <p:cTn id="3" fill="hold">
+                      <p:stCondLst>
+                        <p:cond delay="indefinite"/>
+                      </p:stCondLst>
+                      <p:childTnLst>
+                        <p:par>
+                          <p:cTn id="4" fill="hold">
+                            <p:stCondLst>
+                              <p:cond delay="0"/>
+                            </p:stCondLst>
+                            <p:childTnLst>
+                              <p:par>
+                                <p:cTn id="5" presetID="1" presetClass="entr" presetSubtype="0" fill="hold" grpId="0" nodeType="clickEffect">
+                                  <p:stCondLst>
+                                    <p:cond delay="0"/>
+                                  </p:stCondLst>
+                                  <p:childTnLst>
+                                    <p:set>
+                                      <p:cBhvr>
+                                        <p:cTn id="6" dur="1" fill="hold">
+                                          <p:stCondLst>
+                                            <p:cond delay="0"/>
+                                          </p:stCondLst>
+                                        </p:cTn>
+                                        <p:tgtEl>
+                                          <p:spTgt spid="5"/>
+                                        </p:tgtEl>
+                                        <p:attrNameLst>
+                                          <p:attrName>style.visibility</p:attrName>
+                                        </p:attrNameLst>
+                                      </p:cBhvr>
+                                      <p:to>
+                                        <p:strVal val="visible"/>
+                                      </p:to>
+                                    </p:set>
+                                  </p:childTnLst>
+                                </p:cTn>
+                              </p:par>
+                              <p:par>
+                                <p:cTn id="7" presetID="1" presetClass="entr" presetSubtype="0" fill="hold" nodeType="withEffect">
+                                  <p:stCondLst>
+                                    <p:cond delay="0"/>
+                                  </p:stCondLst>
+                                  <p:childTnLst>
+                                    <p:set>
+                                      <p:cBhvr>
+                                        <p:cTn id="8" dur="1" fill="hold">
+                                          <p:stCondLst>
+                                            <p:cond delay="0"/>
+                                          </p:stCondLst>
+                                        </p:cTn>
+                                        <p:tgtEl>
+                                          <p:spTgt spid="3"/>
+                                        </p:tgtEl>
+                                        <p:attrNameLst>
+                                          <p:attrName>style.visibility</p:attrName>
+                                        </p:attrNameLst>
+                                      </p:cBhvr>
+                                      <p:to>
+                                        <p:strVal val="visible"/>
+                                      </p:to>
+                                    </p:set>
+                                  </p:childTnLst>
+                                </p:cTn>
+                              </p:par>
+                              <p:par>
+                                <p:cTn id="9" presetID="1" presetClass="entr" presetSubtype="0" fill="hold" nodeType="withEffect">
+                                  <p:stCondLst>
+                                    <p:cond delay="0"/>
+                                  </p:stCondLst>
+                                  <p:childTnLst>
+                                    <p:set>
+                                      <p:cBhvr>
+                                        <p:cTn id="10" dur="1" fill="hold">
+                                          <p:stCondLst>
+                                            <p:cond delay="0"/>
+                                          </p:stCondLst>
+                                        </p:cTn>
+                                        <p:tgtEl>
+                                          <p:spTgt spid="8"/>
+                                        </p:tgtEl>
+                                        <p:attrNameLst>
+                                          <p:attrName>style.visibility</p:attrName>
+                                        </p:attrNameLst>
+                                      </p:cBhvr>
+                                      <p:to>
+                                        <p:strVal val="visible"/>
+                                      </p:to>
+                                    </p:set>
+                                  </p:childTnLst>
+                                </p:cTn>
+                              </p:par>
+                            </p:childTnLst>
+                          </p:cTn>
+                        </p:par>
+                      </p:childTnLst>
+                    </p:cTn>
+                  </p:par>
+                </p:childTnLst>
+              </p:cTn>
+              <p:prevCondLst>
+                <p:cond evt="onPrev" delay="0">
+                  <p:tgtEl>
+                    <p:sldTgt/>
+                  </p:tgtEl>
+                </p:cond>
+              </p:prevCondLst>
+              <p:nextCondLst>
+                <p:cond evt="onNext" delay="0">
+                  <p:tgtEl>
+                    <p:sldTgt/>
+                  </p:tgtEl>
+                </p:cond>
+              </p:nextCondLst>
+            </p:seq>
+          </p:childTnLst>
+        </p:cTn>
       </p:par>
     </p:tnLst>
+    <p:bldLst>
+      <p:bldP spid="5" grpId="0" animBg="1"/>
+    </p:bldLst>
   </p:timing>
 </p:sld>
 </file>
@@ -5327,18 +5725,24 @@
       </p:sp>
       <p:sp>
         <p:nvSpPr>
-          <p:cNvPr id="7" name="Rectangle 6"/>
+          <p:cNvPr id="8" name="Rectangle 7"/>
           <p:cNvSpPr/>
           <p:nvPr/>
         </p:nvSpPr>
         <p:spPr>
           <a:xfrm>
-            <a:off x="536306" y="2528900"/>
-            <a:ext cx="2592288" cy="1800200"/>
+            <a:off x="3320243" y="1124744"/>
+            <a:ext cx="2592288" cy="666307"/>
           </a:xfrm>
           <a:prstGeom prst="rect">
             <a:avLst/>
           </a:prstGeom>
+          <a:solidFill>
+            <a:schemeClr val="tx1"/>
+          </a:solidFill>
+          <a:ln>
+            <a:noFill/>
+          </a:ln>
         </p:spPr>
         <p:style>
           <a:lnRef idx="2">
@@ -5362,27 +5766,43 @@
           <a:p>
             <a:pPr algn="ctr"/>
             <a:r>
-              <a:rPr lang="en-US" dirty="0"/>
-              <a:t>Random Topology Power Grids for testing</a:t>
-            </a:r>
-            <a:endParaRPr lang="nl-NL" dirty="0"/>
-          </a:p>
-        </p:txBody>
-      </p:sp>
-      <p:sp>
-        <p:nvSpPr>
-          <p:cNvPr id="8" name="Rectangle 7"/>
+              <a:rPr lang="en-US" sz="1400" dirty="0" smtClean="0">
+                <a:solidFill>
+                  <a:schemeClr val="bg1"/>
+                </a:solidFill>
+                <a:latin typeface="Century Gothic" panose="020B0502020202020204" pitchFamily="34" charset="0"/>
+              </a:rPr>
+              <a:t>Virtual environment design for gaming</a:t>
+            </a:r>
+            <a:endParaRPr lang="nl-NL" sz="1400" dirty="0">
+              <a:solidFill>
+                <a:schemeClr val="bg1"/>
+              </a:solidFill>
+              <a:latin typeface="Century Gothic" panose="020B0502020202020204" pitchFamily="34" charset="0"/>
+            </a:endParaRPr>
+          </a:p>
+        </p:txBody>
+      </p:sp>
+      <p:sp>
+        <p:nvSpPr>
+          <p:cNvPr id="9" name="Rectangle 8"/>
           <p:cNvSpPr/>
           <p:nvPr/>
         </p:nvSpPr>
         <p:spPr>
           <a:xfrm>
-            <a:off x="3320243" y="1250991"/>
-            <a:ext cx="2592288" cy="1800200"/>
+            <a:off x="6156176" y="1556792"/>
+            <a:ext cx="2592288" cy="992444"/>
           </a:xfrm>
           <a:prstGeom prst="rect">
             <a:avLst/>
           </a:prstGeom>
+          <a:solidFill>
+            <a:schemeClr val="tx1"/>
+          </a:solidFill>
+          <a:ln>
+            <a:noFill/>
+          </a:ln>
         </p:spPr>
         <p:style>
           <a:lnRef idx="2">
@@ -5406,27 +5826,70 @@
           <a:p>
             <a:pPr algn="ctr"/>
             <a:r>
-              <a:rPr lang="en-US" dirty="0" smtClean="0"/>
-              <a:t>Virtual environment design for gaming</a:t>
-            </a:r>
-            <a:endParaRPr lang="nl-NL" dirty="0"/>
-          </a:p>
-        </p:txBody>
-      </p:sp>
-      <p:sp>
-        <p:nvSpPr>
-          <p:cNvPr id="9" name="Rectangle 8"/>
+              <a:rPr lang="nl-NL" sz="1400" dirty="0">
+                <a:solidFill>
+                  <a:schemeClr val="bg1"/>
+                </a:solidFill>
+                <a:latin typeface="Century Gothic" panose="020B0502020202020204" pitchFamily="34" charset="0"/>
+              </a:rPr>
+              <a:t>Aircraft </a:t>
+            </a:r>
+            <a:r>
+              <a:rPr lang="nl-NL" sz="1400" dirty="0" smtClean="0">
+                <a:solidFill>
+                  <a:schemeClr val="bg1"/>
+                </a:solidFill>
+                <a:latin typeface="Century Gothic" panose="020B0502020202020204" pitchFamily="34" charset="0"/>
+              </a:rPr>
+              <a:t>modelling with </a:t>
+            </a:r>
+            <a:r>
+              <a:rPr lang="en-US" sz="1400" dirty="0">
+                <a:solidFill>
+                  <a:schemeClr val="bg1"/>
+                </a:solidFill>
+                <a:latin typeface="Century Gothic" panose="020B0502020202020204" pitchFamily="34" charset="0"/>
+              </a:rPr>
+              <a:t>simulating flight in </a:t>
+            </a:r>
+            <a:r>
+              <a:rPr lang="en-US" sz="1400" dirty="0" smtClean="0">
+                <a:solidFill>
+                  <a:schemeClr val="bg1"/>
+                </a:solidFill>
+                <a:latin typeface="Century Gothic" panose="020B0502020202020204" pitchFamily="34" charset="0"/>
+              </a:rPr>
+              <a:t>turbulence</a:t>
+            </a:r>
+            <a:endParaRPr lang="nl-NL" sz="1400" dirty="0">
+              <a:solidFill>
+                <a:schemeClr val="bg1"/>
+              </a:solidFill>
+              <a:latin typeface="Century Gothic" panose="020B0502020202020204" pitchFamily="34" charset="0"/>
+            </a:endParaRPr>
+          </a:p>
+        </p:txBody>
+      </p:sp>
+      <p:sp>
+        <p:nvSpPr>
+          <p:cNvPr id="11" name="Rectangle 10"/>
           <p:cNvSpPr/>
           <p:nvPr/>
         </p:nvSpPr>
         <p:spPr>
           <a:xfrm>
-            <a:off x="6156176" y="2204864"/>
-            <a:ext cx="2592288" cy="1800200"/>
+            <a:off x="5376533" y="4293096"/>
+            <a:ext cx="2592288" cy="900100"/>
           </a:xfrm>
           <a:prstGeom prst="rect">
             <a:avLst/>
           </a:prstGeom>
+          <a:solidFill>
+            <a:schemeClr val="tx1"/>
+          </a:solidFill>
+          <a:ln>
+            <a:noFill/>
+          </a:ln>
         </p:spPr>
         <p:style>
           <a:lnRef idx="2">
@@ -5450,39 +5913,147 @@
           <a:p>
             <a:pPr algn="ctr"/>
             <a:r>
-              <a:rPr lang="nl-NL" dirty="0"/>
-              <a:t>Aircraft </a:t>
-            </a:r>
-            <a:r>
-              <a:rPr lang="nl-NL" dirty="0" smtClean="0"/>
-              <a:t>modelling with </a:t>
-            </a:r>
-            <a:r>
-              <a:rPr lang="en-US" dirty="0"/>
-              <a:t>simulating flight in </a:t>
-            </a:r>
-            <a:r>
-              <a:rPr lang="en-US" dirty="0" smtClean="0"/>
-              <a:t>turbulence</a:t>
-            </a:r>
-            <a:endParaRPr lang="nl-NL" dirty="0"/>
-          </a:p>
-        </p:txBody>
-      </p:sp>
-      <p:sp>
-        <p:nvSpPr>
-          <p:cNvPr id="10" name="Rectangle 9"/>
-          <p:cNvSpPr/>
+              <a:rPr lang="nl-NL" sz="1400" dirty="0" smtClean="0">
+                <a:solidFill>
+                  <a:schemeClr val="bg1"/>
+                </a:solidFill>
+                <a:latin typeface="Century Gothic" panose="020B0502020202020204" pitchFamily="34" charset="0"/>
+              </a:rPr>
+              <a:t>Financial modelling </a:t>
+            </a:r>
+            <a:r>
+              <a:rPr lang="en-US" sz="1400" dirty="0" smtClean="0">
+                <a:solidFill>
+                  <a:schemeClr val="bg1"/>
+                </a:solidFill>
+                <a:latin typeface="Century Gothic" panose="020B0502020202020204" pitchFamily="34" charset="0"/>
+              </a:rPr>
+              <a:t>simulation for market drivers</a:t>
+            </a:r>
+            <a:endParaRPr lang="nl-NL" sz="1400" dirty="0">
+              <a:solidFill>
+                <a:schemeClr val="bg1"/>
+              </a:solidFill>
+              <a:latin typeface="Century Gothic" panose="020B0502020202020204" pitchFamily="34" charset="0"/>
+            </a:endParaRPr>
+          </a:p>
+        </p:txBody>
+      </p:sp>
+      <p:pic>
+        <p:nvPicPr>
+          <p:cNvPr id="3074" name="Picture 2" descr="Power Line Pylon - Free photo on Pixabay"/>
+          <p:cNvPicPr>
+            <a:picLocks noChangeAspect="1" noChangeArrowheads="1"/>
+          </p:cNvPicPr>
           <p:nvPr/>
-        </p:nvSpPr>
-        <p:spPr>
+        </p:nvPicPr>
+        <p:blipFill>
+          <a:blip r:embed="rId4">
+            <a:extLst>
+              <a:ext uri="{28A0092B-C50C-407E-A947-70E740481C1C}">
+                <a14:useLocalDpi xmlns:a14="http://schemas.microsoft.com/office/drawing/2010/main" val="0"/>
+              </a:ext>
+            </a:extLst>
+          </a:blip>
+          <a:srcRect/>
+          <a:stretch>
+            <a:fillRect/>
+          </a:stretch>
+        </p:blipFill>
+        <p:spPr bwMode="auto">
           <a:xfrm>
-            <a:off x="2411760" y="4632697"/>
-            <a:ext cx="2592288" cy="1800200"/>
+            <a:off x="549849" y="1916832"/>
+            <a:ext cx="2592288" cy="1725051"/>
           </a:xfrm>
           <a:prstGeom prst="rect">
             <a:avLst/>
           </a:prstGeom>
+          <a:noFill/>
+          <a:extLst>
+            <a:ext uri="{909E8E84-426E-40DD-AFC4-6F175D3DCCD1}">
+              <a14:hiddenFill xmlns:a14="http://schemas.microsoft.com/office/drawing/2010/main">
+                <a:solidFill>
+                  <a:srgbClr val="FFFFFF"/>
+                </a:solidFill>
+              </a14:hiddenFill>
+            </a:ext>
+          </a:extLst>
+        </p:spPr>
+      </p:pic>
+      <p:pic>
+        <p:nvPicPr>
+          <p:cNvPr id="3077" name="Picture 5"/>
+          <p:cNvPicPr>
+            <a:picLocks noChangeAspect="1" noChangeArrowheads="1"/>
+          </p:cNvPicPr>
+          <p:nvPr/>
+        </p:nvPicPr>
+        <p:blipFill>
+          <a:blip r:embed="rId5">
+            <a:extLst>
+              <a:ext uri="{28A0092B-C50C-407E-A947-70E740481C1C}">
+                <a14:useLocalDpi xmlns:a14="http://schemas.microsoft.com/office/drawing/2010/main" val="0"/>
+              </a:ext>
+            </a:extLst>
+          </a:blip>
+          <a:srcRect/>
+          <a:stretch>
+            <a:fillRect/>
+          </a:stretch>
+        </p:blipFill>
+        <p:spPr bwMode="auto">
+          <a:xfrm>
+            <a:off x="3320244" y="1777502"/>
+            <a:ext cx="2592288" cy="1367453"/>
+          </a:xfrm>
+          <a:prstGeom prst="rect">
+            <a:avLst/>
+          </a:prstGeom>
+          <a:noFill/>
+          <a:ln>
+            <a:noFill/>
+          </a:ln>
+          <a:extLst>
+            <a:ext uri="{909E8E84-426E-40DD-AFC4-6F175D3DCCD1}">
+              <a14:hiddenFill xmlns:a14="http://schemas.microsoft.com/office/drawing/2010/main">
+                <a:solidFill>
+                  <a:schemeClr val="accent1"/>
+                </a:solidFill>
+              </a14:hiddenFill>
+            </a:ext>
+            <a:ext uri="{91240B29-F687-4F45-9708-019B960494DF}">
+              <a14:hiddenLine xmlns:a14="http://schemas.microsoft.com/office/drawing/2010/main" w="9525">
+                <a:solidFill>
+                  <a:schemeClr val="tx1"/>
+                </a:solidFill>
+                <a:miter lim="800000"/>
+                <a:headEnd/>
+                <a:tailEnd/>
+              </a14:hiddenLine>
+            </a:ext>
+          </a:extLst>
+        </p:spPr>
+      </p:pic>
+      <p:sp>
+        <p:nvSpPr>
+          <p:cNvPr id="7" name="Rectangle 6"/>
+          <p:cNvSpPr/>
+          <p:nvPr/>
+        </p:nvSpPr>
+        <p:spPr>
+          <a:xfrm>
+            <a:off x="549849" y="1340768"/>
+            <a:ext cx="2592288" cy="720080"/>
+          </a:xfrm>
+          <a:prstGeom prst="rect">
+            <a:avLst/>
+          </a:prstGeom>
+          <a:solidFill>
+            <a:schemeClr val="tx1"/>
+          </a:solidFill>
+          <a:ln>
+            <a:noFill/>
+          </a:ln>
         </p:spPr>
         <p:style>
           <a:lnRef idx="2">
@@ -5506,27 +6077,151 @@
           <a:p>
             <a:pPr algn="ctr"/>
             <a:r>
-              <a:rPr lang="en-US" dirty="0" smtClean="0"/>
-              <a:t>Prototyping new quantum and classical processor architectures</a:t>
-            </a:r>
-            <a:endParaRPr lang="nl-NL" dirty="0"/>
-          </a:p>
-        </p:txBody>
-      </p:sp>
-      <p:sp>
-        <p:nvSpPr>
-          <p:cNvPr id="11" name="Rectangle 10"/>
-          <p:cNvSpPr/>
+              <a:rPr lang="en-US" sz="1400" dirty="0">
+                <a:solidFill>
+                  <a:schemeClr val="bg1"/>
+                </a:solidFill>
+                <a:latin typeface="Century Gothic" panose="020B0502020202020204" pitchFamily="34" charset="0"/>
+              </a:rPr>
+              <a:t>Random Topology Power Grids for testing</a:t>
+            </a:r>
+            <a:endParaRPr lang="nl-NL" sz="1400" dirty="0">
+              <a:solidFill>
+                <a:schemeClr val="bg1"/>
+              </a:solidFill>
+              <a:latin typeface="Century Gothic" panose="020B0502020202020204" pitchFamily="34" charset="0"/>
+            </a:endParaRPr>
+          </a:p>
+        </p:txBody>
+      </p:sp>
+      <p:pic>
+        <p:nvPicPr>
+          <p:cNvPr id="3080" name="Picture 8"/>
+          <p:cNvPicPr>
+            <a:picLocks noChangeAspect="1" noChangeArrowheads="1"/>
+          </p:cNvPicPr>
           <p:nvPr/>
-        </p:nvSpPr>
-        <p:spPr>
+        </p:nvPicPr>
+        <p:blipFill>
+          <a:blip r:embed="rId6">
+            <a:extLst>
+              <a:ext uri="{28A0092B-C50C-407E-A947-70E740481C1C}">
+                <a14:useLocalDpi xmlns:a14="http://schemas.microsoft.com/office/drawing/2010/main" val="0"/>
+              </a:ext>
+            </a:extLst>
+          </a:blip>
+          <a:srcRect/>
+          <a:stretch>
+            <a:fillRect/>
+          </a:stretch>
+        </p:blipFill>
+        <p:spPr bwMode="auto">
           <a:xfrm>
-            <a:off x="5436094" y="4308040"/>
-            <a:ext cx="2592288" cy="1800200"/>
+            <a:off x="6155851" y="2549236"/>
+            <a:ext cx="2592613" cy="1456719"/>
           </a:xfrm>
           <a:prstGeom prst="rect">
             <a:avLst/>
           </a:prstGeom>
+          <a:noFill/>
+          <a:ln>
+            <a:noFill/>
+          </a:ln>
+          <a:extLst>
+            <a:ext uri="{909E8E84-426E-40DD-AFC4-6F175D3DCCD1}">
+              <a14:hiddenFill xmlns:a14="http://schemas.microsoft.com/office/drawing/2010/main">
+                <a:solidFill>
+                  <a:schemeClr val="accent1"/>
+                </a:solidFill>
+              </a14:hiddenFill>
+            </a:ext>
+            <a:ext uri="{91240B29-F687-4F45-9708-019B960494DF}">
+              <a14:hiddenLine xmlns:a14="http://schemas.microsoft.com/office/drawing/2010/main" w="9525">
+                <a:solidFill>
+                  <a:schemeClr val="tx1"/>
+                </a:solidFill>
+                <a:miter lim="800000"/>
+                <a:headEnd/>
+                <a:tailEnd/>
+              </a14:hiddenLine>
+            </a:ext>
+          </a:extLst>
+        </p:spPr>
+      </p:pic>
+      <p:pic>
+        <p:nvPicPr>
+          <p:cNvPr id="3081" name="Picture 9"/>
+          <p:cNvPicPr>
+            <a:picLocks noChangeAspect="1" noChangeArrowheads="1"/>
+          </p:cNvPicPr>
+          <p:nvPr/>
+        </p:nvPicPr>
+        <p:blipFill>
+          <a:blip r:embed="rId7" cstate="print">
+            <a:extLst>
+              <a:ext uri="{28A0092B-C50C-407E-A947-70E740481C1C}">
+                <a14:useLocalDpi xmlns:a14="http://schemas.microsoft.com/office/drawing/2010/main" val="0"/>
+              </a:ext>
+            </a:extLst>
+          </a:blip>
+          <a:srcRect/>
+          <a:stretch>
+            <a:fillRect/>
+          </a:stretch>
+        </p:blipFill>
+        <p:spPr bwMode="auto">
+          <a:xfrm>
+            <a:off x="5076056" y="5008841"/>
+            <a:ext cx="3193242" cy="1540866"/>
+          </a:xfrm>
+          <a:prstGeom prst="rect">
+            <a:avLst/>
+          </a:prstGeom>
+          <a:noFill/>
+          <a:ln>
+            <a:noFill/>
+          </a:ln>
+          <a:extLst>
+            <a:ext uri="{909E8E84-426E-40DD-AFC4-6F175D3DCCD1}">
+              <a14:hiddenFill xmlns:a14="http://schemas.microsoft.com/office/drawing/2010/main">
+                <a:solidFill>
+                  <a:schemeClr val="accent1"/>
+                </a:solidFill>
+              </a14:hiddenFill>
+            </a:ext>
+            <a:ext uri="{91240B29-F687-4F45-9708-019B960494DF}">
+              <a14:hiddenLine xmlns:a14="http://schemas.microsoft.com/office/drawing/2010/main" w="9525">
+                <a:solidFill>
+                  <a:schemeClr val="tx1"/>
+                </a:solidFill>
+                <a:miter lim="800000"/>
+                <a:headEnd/>
+                <a:tailEnd/>
+              </a14:hiddenLine>
+            </a:ext>
+          </a:extLst>
+        </p:spPr>
+      </p:pic>
+      <p:sp>
+        <p:nvSpPr>
+          <p:cNvPr id="10" name="Rectangle 9"/>
+          <p:cNvSpPr/>
+          <p:nvPr/>
+        </p:nvSpPr>
+        <p:spPr>
+          <a:xfrm>
+            <a:off x="1691680" y="4180749"/>
+            <a:ext cx="2592288" cy="668241"/>
+          </a:xfrm>
+          <a:prstGeom prst="rect">
+            <a:avLst/>
+          </a:prstGeom>
+          <a:solidFill>
+            <a:schemeClr val="tx1"/>
+          </a:solidFill>
+          <a:ln>
+            <a:noFill/>
+          </a:ln>
         </p:spPr>
         <p:style>
           <a:lnRef idx="2">
@@ -5550,17 +6245,326 @@
           <a:p>
             <a:pPr algn="ctr"/>
             <a:r>
-              <a:rPr lang="nl-NL" dirty="0" smtClean="0"/>
-              <a:t>Financial modelling </a:t>
-            </a:r>
-            <a:r>
-              <a:rPr lang="en-US" dirty="0" smtClean="0"/>
-              <a:t>simulation for market drivers</a:t>
-            </a:r>
-            <a:endParaRPr lang="nl-NL" dirty="0"/>
-          </a:p>
-        </p:txBody>
-      </p:sp>
+              <a:rPr lang="en-US" sz="1400" dirty="0" smtClean="0">
+                <a:solidFill>
+                  <a:schemeClr val="bg1"/>
+                </a:solidFill>
+                <a:latin typeface="Century Gothic" panose="020B0502020202020204" pitchFamily="34" charset="0"/>
+              </a:rPr>
+              <a:t>Certified random numbers</a:t>
+            </a:r>
+            <a:r>
+              <a:rPr lang="nl-NL" sz="1400" dirty="0">
+                <a:solidFill>
+                  <a:schemeClr val="bg1"/>
+                </a:solidFill>
+                <a:latin typeface="Century Gothic" panose="020B0502020202020204" pitchFamily="34" charset="0"/>
+              </a:rPr>
+              <a:t> </a:t>
+            </a:r>
+            <a:r>
+              <a:rPr lang="nl-NL" sz="1400" dirty="0" smtClean="0">
+                <a:solidFill>
+                  <a:schemeClr val="bg1"/>
+                </a:solidFill>
+                <a:latin typeface="Century Gothic" panose="020B0502020202020204" pitchFamily="34" charset="0"/>
+              </a:rPr>
+              <a:t>for blockchain</a:t>
+            </a:r>
+            <a:endParaRPr lang="en-US" sz="1400" dirty="0" smtClean="0">
+              <a:solidFill>
+                <a:schemeClr val="bg1"/>
+              </a:solidFill>
+              <a:latin typeface="Century Gothic" panose="020B0502020202020204" pitchFamily="34" charset="0"/>
+            </a:endParaRPr>
+          </a:p>
+        </p:txBody>
+      </p:sp>
+      <p:pic>
+        <p:nvPicPr>
+          <p:cNvPr id="3083" name="Picture 11"/>
+          <p:cNvPicPr>
+            <a:picLocks noChangeAspect="1" noChangeArrowheads="1"/>
+          </p:cNvPicPr>
+          <p:nvPr/>
+        </p:nvPicPr>
+        <p:blipFill>
+          <a:blip r:embed="rId8">
+            <a:extLst>
+              <a:ext uri="{28A0092B-C50C-407E-A947-70E740481C1C}">
+                <a14:useLocalDpi xmlns:a14="http://schemas.microsoft.com/office/drawing/2010/main" val="0"/>
+              </a:ext>
+            </a:extLst>
+          </a:blip>
+          <a:srcRect/>
+          <a:stretch>
+            <a:fillRect/>
+          </a:stretch>
+        </p:blipFill>
+        <p:spPr bwMode="auto">
+          <a:xfrm>
+            <a:off x="1691681" y="4815155"/>
+            <a:ext cx="2592288" cy="1725050"/>
+          </a:xfrm>
+          <a:prstGeom prst="rect">
+            <a:avLst/>
+          </a:prstGeom>
+          <a:noFill/>
+          <a:ln>
+            <a:noFill/>
+          </a:ln>
+          <a:extLst>
+            <a:ext uri="{909E8E84-426E-40DD-AFC4-6F175D3DCCD1}">
+              <a14:hiddenFill xmlns:a14="http://schemas.microsoft.com/office/drawing/2010/main">
+                <a:solidFill>
+                  <a:schemeClr val="accent1"/>
+                </a:solidFill>
+              </a14:hiddenFill>
+            </a:ext>
+            <a:ext uri="{91240B29-F687-4F45-9708-019B960494DF}">
+              <a14:hiddenLine xmlns:a14="http://schemas.microsoft.com/office/drawing/2010/main" w="9525">
+                <a:solidFill>
+                  <a:schemeClr val="tx1"/>
+                </a:solidFill>
+                <a:miter lim="800000"/>
+                <a:headEnd/>
+                <a:tailEnd/>
+              </a14:hiddenLine>
+            </a:ext>
+          </a:extLst>
+        </p:spPr>
+      </p:pic>
+      <p:pic>
+        <p:nvPicPr>
+          <p:cNvPr id="3084" name="Picture 12"/>
+          <p:cNvPicPr>
+            <a:picLocks noChangeAspect="1" noChangeArrowheads="1"/>
+          </p:cNvPicPr>
+          <p:nvPr/>
+        </p:nvPicPr>
+        <p:blipFill>
+          <a:blip r:embed="rId9" cstate="print">
+            <a:extLst>
+              <a:ext uri="{28A0092B-C50C-407E-A947-70E740481C1C}">
+                <a14:useLocalDpi xmlns:a14="http://schemas.microsoft.com/office/drawing/2010/main" val="0"/>
+              </a:ext>
+            </a:extLst>
+          </a:blip>
+          <a:srcRect/>
+          <a:stretch>
+            <a:fillRect/>
+          </a:stretch>
+        </p:blipFill>
+        <p:spPr bwMode="auto">
+          <a:xfrm>
+            <a:off x="1138475" y="1916832"/>
+            <a:ext cx="1415035" cy="589598"/>
+          </a:xfrm>
+          <a:prstGeom prst="rect">
+            <a:avLst/>
+          </a:prstGeom>
+          <a:noFill/>
+          <a:ln>
+            <a:noFill/>
+          </a:ln>
+          <a:extLst>
+            <a:ext uri="{909E8E84-426E-40DD-AFC4-6F175D3DCCD1}">
+              <a14:hiddenFill xmlns:a14="http://schemas.microsoft.com/office/drawing/2010/main">
+                <a:solidFill>
+                  <a:schemeClr val="accent1"/>
+                </a:solidFill>
+              </a14:hiddenFill>
+            </a:ext>
+            <a:ext uri="{91240B29-F687-4F45-9708-019B960494DF}">
+              <a14:hiddenLine xmlns:a14="http://schemas.microsoft.com/office/drawing/2010/main" w="9525">
+                <a:solidFill>
+                  <a:schemeClr val="tx1"/>
+                </a:solidFill>
+                <a:miter lim="800000"/>
+                <a:headEnd/>
+                <a:tailEnd/>
+              </a14:hiddenLine>
+            </a:ext>
+          </a:extLst>
+        </p:spPr>
+      </p:pic>
+      <p:pic>
+        <p:nvPicPr>
+          <p:cNvPr id="3087" name="Picture 15" descr="Xbox - Wikipedia"/>
+          <p:cNvPicPr>
+            <a:picLocks noChangeAspect="1" noChangeArrowheads="1"/>
+          </p:cNvPicPr>
+          <p:nvPr/>
+        </p:nvPicPr>
+        <p:blipFill>
+          <a:blip r:embed="rId10" cstate="print">
+            <a:extLst>
+              <a:ext uri="{28A0092B-C50C-407E-A947-70E740481C1C}">
+                <a14:useLocalDpi xmlns:a14="http://schemas.microsoft.com/office/drawing/2010/main" val="0"/>
+              </a:ext>
+            </a:extLst>
+          </a:blip>
+          <a:srcRect/>
+          <a:stretch>
+            <a:fillRect/>
+          </a:stretch>
+        </p:blipFill>
+        <p:spPr bwMode="auto">
+          <a:xfrm>
+            <a:off x="4946967" y="1869768"/>
+            <a:ext cx="859132" cy="683726"/>
+          </a:xfrm>
+          <a:prstGeom prst="rect">
+            <a:avLst/>
+          </a:prstGeom>
+          <a:noFill/>
+          <a:extLst>
+            <a:ext uri="{909E8E84-426E-40DD-AFC4-6F175D3DCCD1}">
+              <a14:hiddenFill xmlns:a14="http://schemas.microsoft.com/office/drawing/2010/main">
+                <a:solidFill>
+                  <a:srgbClr val="FFFFFF"/>
+                </a:solidFill>
+              </a14:hiddenFill>
+            </a:ext>
+          </a:extLst>
+        </p:spPr>
+      </p:pic>
+      <p:pic>
+        <p:nvPicPr>
+          <p:cNvPr id="3089" name="Picture 17" descr="File:Microsoft logo.svg - Wikimedia Commons"/>
+          <p:cNvPicPr>
+            <a:picLocks noChangeAspect="1" noChangeArrowheads="1"/>
+          </p:cNvPicPr>
+          <p:nvPr/>
+        </p:nvPicPr>
+        <p:blipFill>
+          <a:blip r:embed="rId11" cstate="print">
+            <a:extLst>
+              <a:ext uri="{28A0092B-C50C-407E-A947-70E740481C1C}">
+                <a14:useLocalDpi xmlns:a14="http://schemas.microsoft.com/office/drawing/2010/main" val="0"/>
+              </a:ext>
+            </a:extLst>
+          </a:blip>
+          <a:srcRect/>
+          <a:stretch>
+            <a:fillRect/>
+          </a:stretch>
+        </p:blipFill>
+        <p:spPr bwMode="auto">
+          <a:xfrm>
+            <a:off x="5004967" y="2636912"/>
+            <a:ext cx="743131" cy="743131"/>
+          </a:xfrm>
+          <a:prstGeom prst="rect">
+            <a:avLst/>
+          </a:prstGeom>
+          <a:noFill/>
+          <a:extLst>
+            <a:ext uri="{909E8E84-426E-40DD-AFC4-6F175D3DCCD1}">
+              <a14:hiddenFill xmlns:a14="http://schemas.microsoft.com/office/drawing/2010/main">
+                <a:solidFill>
+                  <a:srgbClr val="FFFFFF"/>
+                </a:solidFill>
+              </a14:hiddenFill>
+            </a:ext>
+          </a:extLst>
+        </p:spPr>
+      </p:pic>
+      <p:pic>
+        <p:nvPicPr>
+          <p:cNvPr id="3091" name="Picture 19" descr="Lockheed Martin - ILIAS Solutions"/>
+          <p:cNvPicPr>
+            <a:picLocks noChangeAspect="1" noChangeArrowheads="1"/>
+          </p:cNvPicPr>
+          <p:nvPr/>
+        </p:nvPicPr>
+        <p:blipFill>
+          <a:blip r:embed="rId12">
+            <a:extLst>
+              <a:ext uri="{28A0092B-C50C-407E-A947-70E740481C1C}">
+                <a14:useLocalDpi xmlns:a14="http://schemas.microsoft.com/office/drawing/2010/main" val="0"/>
+              </a:ext>
+            </a:extLst>
+          </a:blip>
+          <a:srcRect/>
+          <a:stretch>
+            <a:fillRect/>
+          </a:stretch>
+        </p:blipFill>
+        <p:spPr bwMode="auto">
+          <a:xfrm>
+            <a:off x="6784975" y="3119417"/>
+            <a:ext cx="2286000" cy="1466851"/>
+          </a:xfrm>
+          <a:prstGeom prst="rect">
+            <a:avLst/>
+          </a:prstGeom>
+          <a:noFill/>
+          <a:extLst>
+            <a:ext uri="{909E8E84-426E-40DD-AFC4-6F175D3DCCD1}">
+              <a14:hiddenFill xmlns:a14="http://schemas.microsoft.com/office/drawing/2010/main">
+                <a:solidFill>
+                  <a:srgbClr val="FFFFFF"/>
+                </a:solidFill>
+              </a14:hiddenFill>
+            </a:ext>
+          </a:extLst>
+        </p:spPr>
+      </p:pic>
+      <p:pic>
+        <p:nvPicPr>
+          <p:cNvPr id="3094" name="Picture 22"/>
+          <p:cNvPicPr>
+            <a:picLocks noChangeAspect="1" noChangeArrowheads="1"/>
+          </p:cNvPicPr>
+          <p:nvPr/>
+        </p:nvPicPr>
+        <p:blipFill>
+          <a:blip r:embed="rId13" cstate="print">
+            <a:extLst>
+              <a:ext uri="{28A0092B-C50C-407E-A947-70E740481C1C}">
+                <a14:useLocalDpi xmlns:a14="http://schemas.microsoft.com/office/drawing/2010/main" val="0"/>
+              </a:ext>
+            </a:extLst>
+          </a:blip>
+          <a:srcRect/>
+          <a:stretch>
+            <a:fillRect/>
+          </a:stretch>
+        </p:blipFill>
+        <p:spPr bwMode="auto">
+          <a:xfrm>
+            <a:off x="7268276" y="5189156"/>
+            <a:ext cx="1053783" cy="590118"/>
+          </a:xfrm>
+          <a:prstGeom prst="rect">
+            <a:avLst/>
+          </a:prstGeom>
+          <a:noFill/>
+          <a:ln>
+            <a:noFill/>
+          </a:ln>
+          <a:extLst>
+            <a:ext uri="{909E8E84-426E-40DD-AFC4-6F175D3DCCD1}">
+              <a14:hiddenFill xmlns:a14="http://schemas.microsoft.com/office/drawing/2010/main">
+                <a:solidFill>
+                  <a:schemeClr val="accent1"/>
+                </a:solidFill>
+              </a14:hiddenFill>
+            </a:ext>
+            <a:ext uri="{91240B29-F687-4F45-9708-019B960494DF}">
+              <a14:hiddenLine xmlns:a14="http://schemas.microsoft.com/office/drawing/2010/main" w="9525">
+                <a:solidFill>
+                  <a:schemeClr val="tx1"/>
+                </a:solidFill>
+                <a:miter lim="800000"/>
+                <a:headEnd/>
+                <a:tailEnd/>
+              </a14:hiddenLine>
+            </a:ext>
+          </a:extLst>
+        </p:spPr>
+      </p:pic>
     </p:spTree>
     <p:extLst>
       <p:ext uri="{BB962C8B-B14F-4D97-AF65-F5344CB8AC3E}">
@@ -5574,9 +6578,534 @@
   <p:timing>
     <p:tnLst>
       <p:par>
-        <p:cTn id="1" dur="indefinite" restart="never" nodeType="tmRoot"/>
+        <p:cTn id="1" dur="indefinite" restart="never" nodeType="tmRoot">
+          <p:childTnLst>
+            <p:seq concurrent="1" nextAc="seek">
+              <p:cTn id="2" dur="indefinite" nodeType="mainSeq">
+                <p:childTnLst>
+                  <p:par>
+                    <p:cTn id="3" fill="hold">
+                      <p:stCondLst>
+                        <p:cond delay="indefinite"/>
+                      </p:stCondLst>
+                      <p:childTnLst>
+                        <p:par>
+                          <p:cTn id="4" fill="hold">
+                            <p:stCondLst>
+                              <p:cond delay="0"/>
+                            </p:stCondLst>
+                            <p:childTnLst>
+                              <p:par>
+                                <p:cTn id="5" presetID="1" presetClass="entr" presetSubtype="0" fill="hold" grpId="0" nodeType="clickEffect">
+                                  <p:stCondLst>
+                                    <p:cond delay="0"/>
+                                  </p:stCondLst>
+                                  <p:childTnLst>
+                                    <p:set>
+                                      <p:cBhvr>
+                                        <p:cTn id="6" dur="1" fill="hold">
+                                          <p:stCondLst>
+                                            <p:cond delay="0"/>
+                                          </p:stCondLst>
+                                        </p:cTn>
+                                        <p:tgtEl>
+                                          <p:spTgt spid="7"/>
+                                        </p:tgtEl>
+                                        <p:attrNameLst>
+                                          <p:attrName>style.visibility</p:attrName>
+                                        </p:attrNameLst>
+                                      </p:cBhvr>
+                                      <p:to>
+                                        <p:strVal val="visible"/>
+                                      </p:to>
+                                    </p:set>
+                                  </p:childTnLst>
+                                </p:cTn>
+                              </p:par>
+                              <p:par>
+                                <p:cTn id="7" presetID="1" presetClass="entr" presetSubtype="0" fill="hold" nodeType="withEffect">
+                                  <p:stCondLst>
+                                    <p:cond delay="0"/>
+                                  </p:stCondLst>
+                                  <p:childTnLst>
+                                    <p:set>
+                                      <p:cBhvr>
+                                        <p:cTn id="8" dur="1" fill="hold">
+                                          <p:stCondLst>
+                                            <p:cond delay="0"/>
+                                          </p:stCondLst>
+                                        </p:cTn>
+                                        <p:tgtEl>
+                                          <p:spTgt spid="3084"/>
+                                        </p:tgtEl>
+                                        <p:attrNameLst>
+                                          <p:attrName>style.visibility</p:attrName>
+                                        </p:attrNameLst>
+                                      </p:cBhvr>
+                                      <p:to>
+                                        <p:strVal val="visible"/>
+                                      </p:to>
+                                    </p:set>
+                                  </p:childTnLst>
+                                </p:cTn>
+                              </p:par>
+                              <p:par>
+                                <p:cTn id="9" presetID="1" presetClass="entr" presetSubtype="0" fill="hold" nodeType="withEffect">
+                                  <p:stCondLst>
+                                    <p:cond delay="0"/>
+                                  </p:stCondLst>
+                                  <p:childTnLst>
+                                    <p:set>
+                                      <p:cBhvr>
+                                        <p:cTn id="10" dur="1" fill="hold">
+                                          <p:stCondLst>
+                                            <p:cond delay="0"/>
+                                          </p:stCondLst>
+                                        </p:cTn>
+                                        <p:tgtEl>
+                                          <p:spTgt spid="3074"/>
+                                        </p:tgtEl>
+                                        <p:attrNameLst>
+                                          <p:attrName>style.visibility</p:attrName>
+                                        </p:attrNameLst>
+                                      </p:cBhvr>
+                                      <p:to>
+                                        <p:strVal val="visible"/>
+                                      </p:to>
+                                    </p:set>
+                                  </p:childTnLst>
+                                </p:cTn>
+                              </p:par>
+                            </p:childTnLst>
+                          </p:cTn>
+                        </p:par>
+                      </p:childTnLst>
+                    </p:cTn>
+                  </p:par>
+                  <p:par>
+                    <p:cTn id="11" fill="hold">
+                      <p:stCondLst>
+                        <p:cond delay="indefinite"/>
+                      </p:stCondLst>
+                      <p:childTnLst>
+                        <p:par>
+                          <p:cTn id="12" fill="hold">
+                            <p:stCondLst>
+                              <p:cond delay="0"/>
+                            </p:stCondLst>
+                            <p:childTnLst>
+                              <p:par>
+                                <p:cTn id="13" presetID="1" presetClass="entr" presetSubtype="0" fill="hold" grpId="0" nodeType="clickEffect">
+                                  <p:stCondLst>
+                                    <p:cond delay="0"/>
+                                  </p:stCondLst>
+                                  <p:childTnLst>
+                                    <p:set>
+                                      <p:cBhvr>
+                                        <p:cTn id="14" dur="1" fill="hold">
+                                          <p:stCondLst>
+                                            <p:cond delay="0"/>
+                                          </p:stCondLst>
+                                        </p:cTn>
+                                        <p:tgtEl>
+                                          <p:spTgt spid="8"/>
+                                        </p:tgtEl>
+                                        <p:attrNameLst>
+                                          <p:attrName>style.visibility</p:attrName>
+                                        </p:attrNameLst>
+                                      </p:cBhvr>
+                                      <p:to>
+                                        <p:strVal val="visible"/>
+                                      </p:to>
+                                    </p:set>
+                                  </p:childTnLst>
+                                </p:cTn>
+                              </p:par>
+                              <p:par>
+                                <p:cTn id="15" presetID="1" presetClass="entr" presetSubtype="0" fill="hold" nodeType="withEffect">
+                                  <p:stCondLst>
+                                    <p:cond delay="0"/>
+                                  </p:stCondLst>
+                                  <p:childTnLst>
+                                    <p:set>
+                                      <p:cBhvr>
+                                        <p:cTn id="16" dur="1" fill="hold">
+                                          <p:stCondLst>
+                                            <p:cond delay="0"/>
+                                          </p:stCondLst>
+                                        </p:cTn>
+                                        <p:tgtEl>
+                                          <p:spTgt spid="3087"/>
+                                        </p:tgtEl>
+                                        <p:attrNameLst>
+                                          <p:attrName>style.visibility</p:attrName>
+                                        </p:attrNameLst>
+                                      </p:cBhvr>
+                                      <p:to>
+                                        <p:strVal val="visible"/>
+                                      </p:to>
+                                    </p:set>
+                                  </p:childTnLst>
+                                </p:cTn>
+                              </p:par>
+                              <p:par>
+                                <p:cTn id="17" presetID="1" presetClass="entr" presetSubtype="0" fill="hold" nodeType="withEffect">
+                                  <p:stCondLst>
+                                    <p:cond delay="0"/>
+                                  </p:stCondLst>
+                                  <p:childTnLst>
+                                    <p:set>
+                                      <p:cBhvr>
+                                        <p:cTn id="18" dur="1" fill="hold">
+                                          <p:stCondLst>
+                                            <p:cond delay="0"/>
+                                          </p:stCondLst>
+                                        </p:cTn>
+                                        <p:tgtEl>
+                                          <p:spTgt spid="3089"/>
+                                        </p:tgtEl>
+                                        <p:attrNameLst>
+                                          <p:attrName>style.visibility</p:attrName>
+                                        </p:attrNameLst>
+                                      </p:cBhvr>
+                                      <p:to>
+                                        <p:strVal val="visible"/>
+                                      </p:to>
+                                    </p:set>
+                                  </p:childTnLst>
+                                </p:cTn>
+                              </p:par>
+                              <p:par>
+                                <p:cTn id="19" presetID="1" presetClass="entr" presetSubtype="0" fill="hold" nodeType="withEffect">
+                                  <p:stCondLst>
+                                    <p:cond delay="0"/>
+                                  </p:stCondLst>
+                                  <p:childTnLst>
+                                    <p:set>
+                                      <p:cBhvr>
+                                        <p:cTn id="20" dur="1" fill="hold">
+                                          <p:stCondLst>
+                                            <p:cond delay="0"/>
+                                          </p:stCondLst>
+                                        </p:cTn>
+                                        <p:tgtEl>
+                                          <p:spTgt spid="3077"/>
+                                        </p:tgtEl>
+                                        <p:attrNameLst>
+                                          <p:attrName>style.visibility</p:attrName>
+                                        </p:attrNameLst>
+                                      </p:cBhvr>
+                                      <p:to>
+                                        <p:strVal val="visible"/>
+                                      </p:to>
+                                    </p:set>
+                                  </p:childTnLst>
+                                </p:cTn>
+                              </p:par>
+                            </p:childTnLst>
+                          </p:cTn>
+                        </p:par>
+                      </p:childTnLst>
+                    </p:cTn>
+                  </p:par>
+                  <p:par>
+                    <p:cTn id="21" fill="hold">
+                      <p:stCondLst>
+                        <p:cond delay="indefinite"/>
+                      </p:stCondLst>
+                      <p:childTnLst>
+                        <p:par>
+                          <p:cTn id="22" fill="hold">
+                            <p:stCondLst>
+                              <p:cond delay="0"/>
+                            </p:stCondLst>
+                            <p:childTnLst>
+                              <p:par>
+                                <p:cTn id="23" presetID="1" presetClass="entr" presetSubtype="0" fill="hold" grpId="0" nodeType="clickEffect">
+                                  <p:stCondLst>
+                                    <p:cond delay="0"/>
+                                  </p:stCondLst>
+                                  <p:childTnLst>
+                                    <p:set>
+                                      <p:cBhvr>
+                                        <p:cTn id="24" dur="1" fill="hold">
+                                          <p:stCondLst>
+                                            <p:cond delay="0"/>
+                                          </p:stCondLst>
+                                        </p:cTn>
+                                        <p:tgtEl>
+                                          <p:spTgt spid="9"/>
+                                        </p:tgtEl>
+                                        <p:attrNameLst>
+                                          <p:attrName>style.visibility</p:attrName>
+                                        </p:attrNameLst>
+                                      </p:cBhvr>
+                                      <p:to>
+                                        <p:strVal val="visible"/>
+                                      </p:to>
+                                    </p:set>
+                                  </p:childTnLst>
+                                </p:cTn>
+                              </p:par>
+                              <p:par>
+                                <p:cTn id="25" presetID="1" presetClass="entr" presetSubtype="0" fill="hold" nodeType="withEffect">
+                                  <p:stCondLst>
+                                    <p:cond delay="0"/>
+                                  </p:stCondLst>
+                                  <p:childTnLst>
+                                    <p:set>
+                                      <p:cBhvr>
+                                        <p:cTn id="26" dur="1" fill="hold">
+                                          <p:stCondLst>
+                                            <p:cond delay="0"/>
+                                          </p:stCondLst>
+                                        </p:cTn>
+                                        <p:tgtEl>
+                                          <p:spTgt spid="3080"/>
+                                        </p:tgtEl>
+                                        <p:attrNameLst>
+                                          <p:attrName>style.visibility</p:attrName>
+                                        </p:attrNameLst>
+                                      </p:cBhvr>
+                                      <p:to>
+                                        <p:strVal val="visible"/>
+                                      </p:to>
+                                    </p:set>
+                                  </p:childTnLst>
+                                </p:cTn>
+                              </p:par>
+                              <p:par>
+                                <p:cTn id="27" presetID="1" presetClass="entr" presetSubtype="0" fill="hold" nodeType="withEffect">
+                                  <p:stCondLst>
+                                    <p:cond delay="0"/>
+                                  </p:stCondLst>
+                                  <p:childTnLst>
+                                    <p:set>
+                                      <p:cBhvr>
+                                        <p:cTn id="28" dur="1" fill="hold">
+                                          <p:stCondLst>
+                                            <p:cond delay="0"/>
+                                          </p:stCondLst>
+                                        </p:cTn>
+                                        <p:tgtEl>
+                                          <p:spTgt spid="3091"/>
+                                        </p:tgtEl>
+                                        <p:attrNameLst>
+                                          <p:attrName>style.visibility</p:attrName>
+                                        </p:attrNameLst>
+                                      </p:cBhvr>
+                                      <p:to>
+                                        <p:strVal val="visible"/>
+                                      </p:to>
+                                    </p:set>
+                                  </p:childTnLst>
+                                </p:cTn>
+                              </p:par>
+                            </p:childTnLst>
+                          </p:cTn>
+                        </p:par>
+                      </p:childTnLst>
+                    </p:cTn>
+                  </p:par>
+                  <p:par>
+                    <p:cTn id="29" fill="hold">
+                      <p:stCondLst>
+                        <p:cond delay="indefinite"/>
+                      </p:stCondLst>
+                      <p:childTnLst>
+                        <p:par>
+                          <p:cTn id="30" fill="hold">
+                            <p:stCondLst>
+                              <p:cond delay="0"/>
+                            </p:stCondLst>
+                            <p:childTnLst>
+                              <p:par>
+                                <p:cTn id="31" presetID="1" presetClass="entr" presetSubtype="0" fill="hold" grpId="0" nodeType="clickEffect">
+                                  <p:stCondLst>
+                                    <p:cond delay="0"/>
+                                  </p:stCondLst>
+                                  <p:childTnLst>
+                                    <p:set>
+                                      <p:cBhvr>
+                                        <p:cTn id="32" dur="1" fill="hold">
+                                          <p:stCondLst>
+                                            <p:cond delay="0"/>
+                                          </p:stCondLst>
+                                        </p:cTn>
+                                        <p:tgtEl>
+                                          <p:spTgt spid="11"/>
+                                        </p:tgtEl>
+                                        <p:attrNameLst>
+                                          <p:attrName>style.visibility</p:attrName>
+                                        </p:attrNameLst>
+                                      </p:cBhvr>
+                                      <p:to>
+                                        <p:strVal val="visible"/>
+                                      </p:to>
+                                    </p:set>
+                                  </p:childTnLst>
+                                </p:cTn>
+                              </p:par>
+                              <p:par>
+                                <p:cTn id="33" presetID="1" presetClass="entr" presetSubtype="0" fill="hold" nodeType="withEffect">
+                                  <p:stCondLst>
+                                    <p:cond delay="0"/>
+                                  </p:stCondLst>
+                                  <p:childTnLst>
+                                    <p:set>
+                                      <p:cBhvr>
+                                        <p:cTn id="34" dur="1" fill="hold">
+                                          <p:stCondLst>
+                                            <p:cond delay="0"/>
+                                          </p:stCondLst>
+                                        </p:cTn>
+                                        <p:tgtEl>
+                                          <p:spTgt spid="3094"/>
+                                        </p:tgtEl>
+                                        <p:attrNameLst>
+                                          <p:attrName>style.visibility</p:attrName>
+                                        </p:attrNameLst>
+                                      </p:cBhvr>
+                                      <p:to>
+                                        <p:strVal val="visible"/>
+                                      </p:to>
+                                    </p:set>
+                                  </p:childTnLst>
+                                </p:cTn>
+                              </p:par>
+                              <p:par>
+                                <p:cTn id="35" presetID="1" presetClass="entr" presetSubtype="0" fill="hold" nodeType="withEffect">
+                                  <p:stCondLst>
+                                    <p:cond delay="0"/>
+                                  </p:stCondLst>
+                                  <p:childTnLst>
+                                    <p:set>
+                                      <p:cBhvr>
+                                        <p:cTn id="36" dur="1" fill="hold">
+                                          <p:stCondLst>
+                                            <p:cond delay="0"/>
+                                          </p:stCondLst>
+                                        </p:cTn>
+                                        <p:tgtEl>
+                                          <p:spTgt spid="3081"/>
+                                        </p:tgtEl>
+                                        <p:attrNameLst>
+                                          <p:attrName>style.visibility</p:attrName>
+                                        </p:attrNameLst>
+                                      </p:cBhvr>
+                                      <p:to>
+                                        <p:strVal val="visible"/>
+                                      </p:to>
+                                    </p:set>
+                                  </p:childTnLst>
+                                </p:cTn>
+                              </p:par>
+                            </p:childTnLst>
+                          </p:cTn>
+                        </p:par>
+                      </p:childTnLst>
+                    </p:cTn>
+                  </p:par>
+                  <p:par>
+                    <p:cTn id="37" fill="hold">
+                      <p:stCondLst>
+                        <p:cond delay="indefinite"/>
+                      </p:stCondLst>
+                      <p:childTnLst>
+                        <p:par>
+                          <p:cTn id="38" fill="hold">
+                            <p:stCondLst>
+                              <p:cond delay="0"/>
+                            </p:stCondLst>
+                            <p:childTnLst>
+                              <p:par>
+                                <p:cTn id="39" presetID="1" presetClass="entr" presetSubtype="0" fill="hold" grpId="0" nodeType="clickEffect">
+                                  <p:stCondLst>
+                                    <p:cond delay="0"/>
+                                  </p:stCondLst>
+                                  <p:childTnLst>
+                                    <p:set>
+                                      <p:cBhvr>
+                                        <p:cTn id="40" dur="1" fill="hold">
+                                          <p:stCondLst>
+                                            <p:cond delay="0"/>
+                                          </p:stCondLst>
+                                        </p:cTn>
+                                        <p:tgtEl>
+                                          <p:spTgt spid="10"/>
+                                        </p:tgtEl>
+                                        <p:attrNameLst>
+                                          <p:attrName>style.visibility</p:attrName>
+                                        </p:attrNameLst>
+                                      </p:cBhvr>
+                                      <p:to>
+                                        <p:strVal val="visible"/>
+                                      </p:to>
+                                    </p:set>
+                                  </p:childTnLst>
+                                </p:cTn>
+                              </p:par>
+                              <p:par>
+                                <p:cTn id="41" presetID="1" presetClass="entr" presetSubtype="0" fill="hold" nodeType="withEffect">
+                                  <p:stCondLst>
+                                    <p:cond delay="0"/>
+                                  </p:stCondLst>
+                                  <p:childTnLst>
+                                    <p:set>
+                                      <p:cBhvr>
+                                        <p:cTn id="42" dur="1" fill="hold">
+                                          <p:stCondLst>
+                                            <p:cond delay="0"/>
+                                          </p:stCondLst>
+                                        </p:cTn>
+                                        <p:tgtEl>
+                                          <p:spTgt spid="3083"/>
+                                        </p:tgtEl>
+                                        <p:attrNameLst>
+                                          <p:attrName>style.visibility</p:attrName>
+                                        </p:attrNameLst>
+                                      </p:cBhvr>
+                                      <p:to>
+                                        <p:strVal val="visible"/>
+                                      </p:to>
+                                    </p:set>
+                                  </p:childTnLst>
+                                </p:cTn>
+                              </p:par>
+                            </p:childTnLst>
+                          </p:cTn>
+                        </p:par>
+                      </p:childTnLst>
+                    </p:cTn>
+                  </p:par>
+                </p:childTnLst>
+              </p:cTn>
+              <p:prevCondLst>
+                <p:cond evt="onPrev" delay="0">
+                  <p:tgtEl>
+                    <p:sldTgt/>
+                  </p:tgtEl>
+                </p:cond>
+              </p:prevCondLst>
+              <p:nextCondLst>
+                <p:cond evt="onNext" delay="0">
+                  <p:tgtEl>
+                    <p:sldTgt/>
+                  </p:tgtEl>
+                </p:cond>
+              </p:nextCondLst>
+            </p:seq>
+          </p:childTnLst>
+        </p:cTn>
       </p:par>
     </p:tnLst>
+    <p:bldLst>
+      <p:bldP spid="8" grpId="0" animBg="1"/>
+      <p:bldP spid="9" grpId="0" animBg="1"/>
+      <p:bldP spid="11" grpId="0" animBg="1"/>
+      <p:bldP spid="7" grpId="0" animBg="1"/>
+      <p:bldP spid="10" grpId="0" animBg="1"/>
+    </p:bldLst>
   </p:timing>
 </p:sld>
 </file>
@@ -5693,7 +7222,7 @@
         </p:nvSpPr>
         <p:spPr>
           <a:xfrm>
-            <a:off x="2084080" y="1997839"/>
+            <a:off x="2084080" y="764704"/>
             <a:ext cx="4968552" cy="646331"/>
           </a:xfrm>
           <a:prstGeom prst="rect">
@@ -5715,7 +7244,16 @@
                 </a:solidFill>
                 <a:latin typeface="Century Gothic" panose="020B0502020202020204" pitchFamily="34" charset="0"/>
               </a:rPr>
-              <a:t>The future is in …</a:t>
+              <a:t>The future is in </a:t>
+            </a:r>
+            <a:r>
+              <a:rPr lang="en-US" sz="3600" dirty="0" smtClean="0">
+                <a:solidFill>
+                  <a:schemeClr val="bg1"/>
+                </a:solidFill>
+                <a:latin typeface="Century Gothic" panose="020B0502020202020204" pitchFamily="34" charset="0"/>
+              </a:rPr>
+              <a:t>GANs</a:t>
             </a:r>
             <a:endParaRPr lang="nl-NL" sz="3600" dirty="0">
               <a:solidFill>
@@ -5726,6 +7264,155 @@
           </a:p>
         </p:txBody>
       </p:sp>
+      <p:pic>
+        <p:nvPicPr>
+          <p:cNvPr id="4099" name="Picture 3"/>
+          <p:cNvPicPr>
+            <a:picLocks noChangeAspect="1" noChangeArrowheads="1"/>
+          </p:cNvPicPr>
+          <p:nvPr/>
+        </p:nvPicPr>
+        <p:blipFill>
+          <a:blip r:embed="rId4">
+            <a:extLst>
+              <a:ext uri="{28A0092B-C50C-407E-A947-70E740481C1C}">
+                <a14:useLocalDpi xmlns:a14="http://schemas.microsoft.com/office/drawing/2010/main" val="0"/>
+              </a:ext>
+            </a:extLst>
+          </a:blip>
+          <a:srcRect/>
+          <a:stretch>
+            <a:fillRect/>
+          </a:stretch>
+        </p:blipFill>
+        <p:spPr bwMode="auto">
+          <a:xfrm>
+            <a:off x="2784392" y="3933056"/>
+            <a:ext cx="4847888" cy="1082695"/>
+          </a:xfrm>
+          <a:prstGeom prst="rect">
+            <a:avLst/>
+          </a:prstGeom>
+          <a:noFill/>
+          <a:ln>
+            <a:noFill/>
+          </a:ln>
+          <a:extLst>
+            <a:ext uri="{909E8E84-426E-40DD-AFC4-6F175D3DCCD1}">
+              <a14:hiddenFill xmlns:a14="http://schemas.microsoft.com/office/drawing/2010/main">
+                <a:solidFill>
+                  <a:schemeClr val="accent1"/>
+                </a:solidFill>
+              </a14:hiddenFill>
+            </a:ext>
+            <a:ext uri="{91240B29-F687-4F45-9708-019B960494DF}">
+              <a14:hiddenLine xmlns:a14="http://schemas.microsoft.com/office/drawing/2010/main" w="9525">
+                <a:solidFill>
+                  <a:schemeClr val="tx1"/>
+                </a:solidFill>
+                <a:miter lim="800000"/>
+                <a:headEnd/>
+                <a:tailEnd/>
+              </a14:hiddenLine>
+            </a:ext>
+          </a:extLst>
+        </p:spPr>
+      </p:pic>
+      <p:pic>
+        <p:nvPicPr>
+          <p:cNvPr id="4101" name="Picture 5" descr="Het nieuwe Google-logo en de reacties - Searchresult"/>
+          <p:cNvPicPr>
+            <a:picLocks noChangeAspect="1" noChangeArrowheads="1"/>
+          </p:cNvPicPr>
+          <p:nvPr/>
+        </p:nvPicPr>
+        <p:blipFill>
+          <a:blip r:embed="rId5" cstate="print">
+            <a:extLst>
+              <a:ext uri="{28A0092B-C50C-407E-A947-70E740481C1C}">
+                <a14:useLocalDpi xmlns:a14="http://schemas.microsoft.com/office/drawing/2010/main" val="0"/>
+              </a:ext>
+            </a:extLst>
+          </a:blip>
+          <a:srcRect/>
+          <a:stretch>
+            <a:fillRect/>
+          </a:stretch>
+        </p:blipFill>
+        <p:spPr bwMode="auto">
+          <a:xfrm>
+            <a:off x="1701698" y="3933056"/>
+            <a:ext cx="1082695" cy="1082695"/>
+          </a:xfrm>
+          <a:prstGeom prst="rect">
+            <a:avLst/>
+          </a:prstGeom>
+          <a:noFill/>
+          <a:extLst>
+            <a:ext uri="{909E8E84-426E-40DD-AFC4-6F175D3DCCD1}">
+              <a14:hiddenFill xmlns:a14="http://schemas.microsoft.com/office/drawing/2010/main">
+                <a:solidFill>
+                  <a:srgbClr val="FFFFFF"/>
+                </a:solidFill>
+              </a14:hiddenFill>
+            </a:ext>
+          </a:extLst>
+        </p:spPr>
+      </p:pic>
+      <p:pic>
+        <p:nvPicPr>
+          <p:cNvPr id="4105" name="Picture 9"/>
+          <p:cNvPicPr>
+            <a:picLocks noChangeAspect="1" noChangeArrowheads="1"/>
+          </p:cNvPicPr>
+          <p:nvPr/>
+        </p:nvPicPr>
+        <p:blipFill>
+          <a:blip r:embed="rId6">
+            <a:extLst>
+              <a:ext uri="{28A0092B-C50C-407E-A947-70E740481C1C}">
+                <a14:useLocalDpi xmlns:a14="http://schemas.microsoft.com/office/drawing/2010/main" val="0"/>
+              </a:ext>
+            </a:extLst>
+          </a:blip>
+          <a:srcRect/>
+          <a:stretch>
+            <a:fillRect/>
+          </a:stretch>
+        </p:blipFill>
+        <p:spPr bwMode="auto">
+          <a:xfrm>
+            <a:off x="2336108" y="1442069"/>
+            <a:ext cx="4464496" cy="2326790"/>
+          </a:xfrm>
+          <a:prstGeom prst="rect">
+            <a:avLst/>
+          </a:prstGeom>
+          <a:noFill/>
+          <a:ln>
+            <a:noFill/>
+          </a:ln>
+          <a:extLst>
+            <a:ext uri="{909E8E84-426E-40DD-AFC4-6F175D3DCCD1}">
+              <a14:hiddenFill xmlns:a14="http://schemas.microsoft.com/office/drawing/2010/main">
+                <a:solidFill>
+                  <a:schemeClr val="accent1"/>
+                </a:solidFill>
+              </a14:hiddenFill>
+            </a:ext>
+            <a:ext uri="{91240B29-F687-4F45-9708-019B960494DF}">
+              <a14:hiddenLine xmlns:a14="http://schemas.microsoft.com/office/drawing/2010/main" w="9525">
+                <a:solidFill>
+                  <a:schemeClr val="tx1"/>
+                </a:solidFill>
+                <a:miter lim="800000"/>
+                <a:headEnd/>
+                <a:tailEnd/>
+              </a14:hiddenLine>
+            </a:ext>
+          </a:extLst>
+        </p:spPr>
+      </p:pic>
     </p:spTree>
     <p:extLst>
       <p:ext uri="{BB962C8B-B14F-4D97-AF65-F5344CB8AC3E}">

</xml_diff>